<commit_message>
Added 01.1_vision notebook + multiple presentation updates.
</commit_message>
<xml_diff>
--- a/presentations/02_cnn_anatomy.pptx
+++ b/presentations/02_cnn_anatomy.pptx
@@ -5,37 +5,38 @@
     <p:sldMasterId id="2147483648" r:id="rId1"/>
   </p:sldMasterIdLst>
   <p:notesMasterIdLst>
-    <p:notesMasterId r:id="rId30"/>
+    <p:notesMasterId r:id="rId31"/>
   </p:notesMasterIdLst>
   <p:sldIdLst>
     <p:sldId id="322" r:id="rId2"/>
-    <p:sldId id="333" r:id="rId3"/>
-    <p:sldId id="326" r:id="rId4"/>
-    <p:sldId id="327" r:id="rId5"/>
-    <p:sldId id="328" r:id="rId6"/>
-    <p:sldId id="329" r:id="rId7"/>
-    <p:sldId id="325" r:id="rId8"/>
-    <p:sldId id="330" r:id="rId9"/>
-    <p:sldId id="332" r:id="rId10"/>
-    <p:sldId id="335" r:id="rId11"/>
-    <p:sldId id="348" r:id="rId12"/>
-    <p:sldId id="324" r:id="rId13"/>
-    <p:sldId id="336" r:id="rId14"/>
-    <p:sldId id="295" r:id="rId15"/>
-    <p:sldId id="338" r:id="rId16"/>
-    <p:sldId id="347" r:id="rId17"/>
-    <p:sldId id="343" r:id="rId18"/>
-    <p:sldId id="337" r:id="rId19"/>
-    <p:sldId id="271" r:id="rId20"/>
-    <p:sldId id="340" r:id="rId21"/>
-    <p:sldId id="342" r:id="rId22"/>
-    <p:sldId id="304" r:id="rId23"/>
-    <p:sldId id="346" r:id="rId24"/>
-    <p:sldId id="309" r:id="rId25"/>
-    <p:sldId id="345" r:id="rId26"/>
-    <p:sldId id="349" r:id="rId27"/>
-    <p:sldId id="344" r:id="rId28"/>
-    <p:sldId id="331" r:id="rId29"/>
+    <p:sldId id="352" r:id="rId3"/>
+    <p:sldId id="333" r:id="rId4"/>
+    <p:sldId id="326" r:id="rId5"/>
+    <p:sldId id="327" r:id="rId6"/>
+    <p:sldId id="328" r:id="rId7"/>
+    <p:sldId id="329" r:id="rId8"/>
+    <p:sldId id="325" r:id="rId9"/>
+    <p:sldId id="330" r:id="rId10"/>
+    <p:sldId id="332" r:id="rId11"/>
+    <p:sldId id="335" r:id="rId12"/>
+    <p:sldId id="348" r:id="rId13"/>
+    <p:sldId id="324" r:id="rId14"/>
+    <p:sldId id="336" r:id="rId15"/>
+    <p:sldId id="295" r:id="rId16"/>
+    <p:sldId id="338" r:id="rId17"/>
+    <p:sldId id="347" r:id="rId18"/>
+    <p:sldId id="343" r:id="rId19"/>
+    <p:sldId id="337" r:id="rId20"/>
+    <p:sldId id="271" r:id="rId21"/>
+    <p:sldId id="340" r:id="rId22"/>
+    <p:sldId id="342" r:id="rId23"/>
+    <p:sldId id="304" r:id="rId24"/>
+    <p:sldId id="346" r:id="rId25"/>
+    <p:sldId id="309" r:id="rId26"/>
+    <p:sldId id="345" r:id="rId27"/>
+    <p:sldId id="349" r:id="rId28"/>
+    <p:sldId id="344" r:id="rId29"/>
+    <p:sldId id="331" r:id="rId30"/>
   </p:sldIdLst>
   <p:sldSz cx="12192000" cy="6858000"/>
   <p:notesSz cx="7077075" cy="9363075"/>
@@ -235,7 +236,7 @@
           <a:p>
             <a:fld id="{FD93C9B2-20F6-4DB1-B471-224337D0AC79}" type="datetimeFigureOut">
               <a:rPr lang="en-US" smtClean="0"/>
-              <a:t>6/6/2022</a:t>
+              <a:t>8/25/2022</a:t>
             </a:fld>
             <a:endParaRPr lang="en-US"/>
           </a:p>
@@ -712,7 +713,7 @@
           <a:p>
             <a:fld id="{3148858F-F1DB-4027-9C85-CCA6849540DD}" type="slidenum">
               <a:rPr lang="en-US" smtClean="0"/>
-              <a:t>10</a:t>
+              <a:t>11</a:t>
             </a:fld>
             <a:endParaRPr lang="en-US"/>
           </a:p>
@@ -796,7 +797,7 @@
           <a:p>
             <a:fld id="{3148858F-F1DB-4027-9C85-CCA6849540DD}" type="slidenum">
               <a:rPr lang="en-US" smtClean="0"/>
-              <a:t>11</a:t>
+              <a:t>12</a:t>
             </a:fld>
             <a:endParaRPr lang="en-US"/>
           </a:p>
@@ -892,7 +893,7 @@
           <a:p>
             <a:fld id="{3148858F-F1DB-4027-9C85-CCA6849540DD}" type="slidenum">
               <a:rPr lang="en-US" smtClean="0"/>
-              <a:t>12</a:t>
+              <a:t>13</a:t>
             </a:fld>
             <a:endParaRPr lang="en-US"/>
           </a:p>
@@ -1021,7 +1022,7 @@
           <a:p>
             <a:fld id="{3148858F-F1DB-4027-9C85-CCA6849540DD}" type="slidenum">
               <a:rPr lang="en-US" smtClean="0"/>
-              <a:t>13</a:t>
+              <a:t>14</a:t>
             </a:fld>
             <a:endParaRPr lang="en-US"/>
           </a:p>
@@ -1216,7 +1217,7 @@
           <a:p>
             <a:fld id="{3148858F-F1DB-4027-9C85-CCA6849540DD}" type="slidenum">
               <a:rPr lang="en-US" smtClean="0"/>
-              <a:t>14</a:t>
+              <a:t>15</a:t>
             </a:fld>
             <a:endParaRPr lang="en-US"/>
           </a:p>
@@ -1389,7 +1390,7 @@
           <a:p>
             <a:fld id="{3148858F-F1DB-4027-9C85-CCA6849540DD}" type="slidenum">
               <a:rPr lang="en-US" smtClean="0"/>
-              <a:t>15</a:t>
+              <a:t>16</a:t>
             </a:fld>
             <a:endParaRPr lang="en-US"/>
           </a:p>
@@ -1476,7 +1477,7 @@
           <a:p>
             <a:fld id="{3148858F-F1DB-4027-9C85-CCA6849540DD}" type="slidenum">
               <a:rPr lang="en-US" smtClean="0"/>
-              <a:t>16</a:t>
+              <a:t>17</a:t>
             </a:fld>
             <a:endParaRPr lang="en-US"/>
           </a:p>
@@ -1564,7 +1565,7 @@
           <a:p>
             <a:fld id="{3148858F-F1DB-4027-9C85-CCA6849540DD}" type="slidenum">
               <a:rPr lang="en-US" smtClean="0"/>
-              <a:t>17</a:t>
+              <a:t>18</a:t>
             </a:fld>
             <a:endParaRPr lang="en-US"/>
           </a:p>
@@ -1816,7 +1817,7 @@
           <a:p>
             <a:fld id="{3148858F-F1DB-4027-9C85-CCA6849540DD}" type="slidenum">
               <a:rPr lang="en-US" smtClean="0"/>
-              <a:t>18</a:t>
+              <a:t>19</a:t>
             </a:fld>
             <a:endParaRPr lang="en-US"/>
           </a:p>
@@ -1903,7 +1904,7 @@
           <a:p>
             <a:fld id="{3148858F-F1DB-4027-9C85-CCA6849540DD}" type="slidenum">
               <a:rPr lang="en-US" smtClean="0"/>
-              <a:t>19</a:t>
+              <a:t>20</a:t>
             </a:fld>
             <a:endParaRPr lang="en-US"/>
           </a:p>
@@ -2160,7 +2161,7 @@
           <a:p>
             <a:fld id="{3148858F-F1DB-4027-9C85-CCA6849540DD}" type="slidenum">
               <a:rPr lang="en-US" smtClean="0"/>
-              <a:t>2</a:t>
+              <a:t>3</a:t>
             </a:fld>
             <a:endParaRPr lang="en-US"/>
           </a:p>
@@ -2297,7 +2298,7 @@
           <a:p>
             <a:fld id="{3148858F-F1DB-4027-9C85-CCA6849540DD}" type="slidenum">
               <a:rPr lang="en-US" smtClean="0"/>
-              <a:t>20</a:t>
+              <a:t>21</a:t>
             </a:fld>
             <a:endParaRPr lang="en-US"/>
           </a:p>
@@ -2438,7 +2439,7 @@
           <a:p>
             <a:fld id="{3148858F-F1DB-4027-9C85-CCA6849540DD}" type="slidenum">
               <a:rPr lang="en-US" smtClean="0"/>
-              <a:t>21</a:t>
+              <a:t>22</a:t>
             </a:fld>
             <a:endParaRPr lang="en-US"/>
           </a:p>
@@ -2684,7 +2685,7 @@
           <a:p>
             <a:fld id="{3148858F-F1DB-4027-9C85-CCA6849540DD}" type="slidenum">
               <a:rPr lang="en-US" smtClean="0"/>
-              <a:t>22</a:t>
+              <a:t>23</a:t>
             </a:fld>
             <a:endParaRPr lang="en-US"/>
           </a:p>
@@ -2786,7 +2787,7 @@
           <a:p>
             <a:fld id="{3148858F-F1DB-4027-9C85-CCA6849540DD}" type="slidenum">
               <a:rPr lang="en-US" smtClean="0"/>
-              <a:t>23</a:t>
+              <a:t>24</a:t>
             </a:fld>
             <a:endParaRPr lang="en-US"/>
           </a:p>
@@ -2893,7 +2894,7 @@
           <a:p>
             <a:fld id="{3148858F-F1DB-4027-9C85-CCA6849540DD}" type="slidenum">
               <a:rPr lang="en-US" smtClean="0"/>
-              <a:t>24</a:t>
+              <a:t>25</a:t>
             </a:fld>
             <a:endParaRPr lang="en-US"/>
           </a:p>
@@ -2977,7 +2978,7 @@
           <a:p>
             <a:fld id="{3148858F-F1DB-4027-9C85-CCA6849540DD}" type="slidenum">
               <a:rPr lang="en-US" smtClean="0"/>
-              <a:t>25</a:t>
+              <a:t>26</a:t>
             </a:fld>
             <a:endParaRPr lang="en-US"/>
           </a:p>
@@ -3061,7 +3062,7 @@
           <a:p>
             <a:fld id="{3148858F-F1DB-4027-9C85-CCA6849540DD}" type="slidenum">
               <a:rPr lang="en-US" smtClean="0"/>
-              <a:t>26</a:t>
+              <a:t>27</a:t>
             </a:fld>
             <a:endParaRPr lang="en-US"/>
           </a:p>
@@ -3154,7 +3155,7 @@
           <a:p>
             <a:fld id="{3148858F-F1DB-4027-9C85-CCA6849540DD}" type="slidenum">
               <a:rPr lang="en-US" smtClean="0"/>
-              <a:t>27</a:t>
+              <a:t>28</a:t>
             </a:fld>
             <a:endParaRPr lang="en-US"/>
           </a:p>
@@ -3253,7 +3254,7 @@
           <a:p>
             <a:fld id="{3148858F-F1DB-4027-9C85-CCA6849540DD}" type="slidenum">
               <a:rPr lang="en-US" smtClean="0"/>
-              <a:t>28</a:t>
+              <a:t>29</a:t>
             </a:fld>
             <a:endParaRPr lang="en-US"/>
           </a:p>
@@ -3526,7 +3527,7 @@
           <a:p>
             <a:fld id="{3148858F-F1DB-4027-9C85-CCA6849540DD}" type="slidenum">
               <a:rPr lang="en-US" smtClean="0"/>
-              <a:t>3</a:t>
+              <a:t>4</a:t>
             </a:fld>
             <a:endParaRPr lang="en-US"/>
           </a:p>
@@ -3706,7 +3707,7 @@
           <a:p>
             <a:fld id="{3148858F-F1DB-4027-9C85-CCA6849540DD}" type="slidenum">
               <a:rPr lang="en-US" smtClean="0"/>
-              <a:t>4</a:t>
+              <a:t>5</a:t>
             </a:fld>
             <a:endParaRPr lang="en-US"/>
           </a:p>
@@ -3826,7 +3827,7 @@
           <a:p>
             <a:fld id="{3148858F-F1DB-4027-9C85-CCA6849540DD}" type="slidenum">
               <a:rPr lang="en-US" smtClean="0"/>
-              <a:t>5</a:t>
+              <a:t>6</a:t>
             </a:fld>
             <a:endParaRPr lang="en-US"/>
           </a:p>
@@ -3937,7 +3938,7 @@
           <a:p>
             <a:fld id="{3148858F-F1DB-4027-9C85-CCA6849540DD}" type="slidenum">
               <a:rPr lang="en-US" smtClean="0"/>
-              <a:t>6</a:t>
+              <a:t>7</a:t>
             </a:fld>
             <a:endParaRPr lang="en-US"/>
           </a:p>
@@ -4126,7 +4127,7 @@
           <a:p>
             <a:fld id="{3148858F-F1DB-4027-9C85-CCA6849540DD}" type="slidenum">
               <a:rPr lang="en-US" smtClean="0"/>
-              <a:t>7</a:t>
+              <a:t>8</a:t>
             </a:fld>
             <a:endParaRPr lang="en-US"/>
           </a:p>
@@ -4258,7 +4259,7 @@
           <a:p>
             <a:fld id="{3148858F-F1DB-4027-9C85-CCA6849540DD}" type="slidenum">
               <a:rPr lang="en-US" smtClean="0"/>
-              <a:t>8</a:t>
+              <a:t>9</a:t>
             </a:fld>
             <a:endParaRPr lang="en-US"/>
           </a:p>
@@ -4414,7 +4415,7 @@
           <a:p>
             <a:fld id="{3148858F-F1DB-4027-9C85-CCA6849540DD}" type="slidenum">
               <a:rPr lang="en-US" smtClean="0"/>
-              <a:t>9</a:t>
+              <a:t>10</a:t>
             </a:fld>
             <a:endParaRPr lang="en-US"/>
           </a:p>
@@ -4580,7 +4581,7 @@
           <a:p>
             <a:fld id="{C3F78080-8D0A-4BE8-A5B4-CB115102D524}" type="datetimeFigureOut">
               <a:rPr lang="en-US" smtClean="0"/>
-              <a:t>6/6/2022</a:t>
+              <a:t>8/25/2022</a:t>
             </a:fld>
             <a:endParaRPr lang="en-US"/>
           </a:p>
@@ -4778,7 +4779,7 @@
           <a:p>
             <a:fld id="{C3F78080-8D0A-4BE8-A5B4-CB115102D524}" type="datetimeFigureOut">
               <a:rPr lang="en-US" smtClean="0"/>
-              <a:t>6/6/2022</a:t>
+              <a:t>8/25/2022</a:t>
             </a:fld>
             <a:endParaRPr lang="en-US"/>
           </a:p>
@@ -4986,7 +4987,7 @@
           <a:p>
             <a:fld id="{C3F78080-8D0A-4BE8-A5B4-CB115102D524}" type="datetimeFigureOut">
               <a:rPr lang="en-US" smtClean="0"/>
-              <a:t>6/6/2022</a:t>
+              <a:t>8/25/2022</a:t>
             </a:fld>
             <a:endParaRPr lang="en-US"/>
           </a:p>
@@ -5184,7 +5185,7 @@
           <a:p>
             <a:fld id="{C3F78080-8D0A-4BE8-A5B4-CB115102D524}" type="datetimeFigureOut">
               <a:rPr lang="en-US" smtClean="0"/>
-              <a:t>6/6/2022</a:t>
+              <a:t>8/25/2022</a:t>
             </a:fld>
             <a:endParaRPr lang="en-US"/>
           </a:p>
@@ -5459,7 +5460,7 @@
           <a:p>
             <a:fld id="{C3F78080-8D0A-4BE8-A5B4-CB115102D524}" type="datetimeFigureOut">
               <a:rPr lang="en-US" smtClean="0"/>
-              <a:t>6/6/2022</a:t>
+              <a:t>8/25/2022</a:t>
             </a:fld>
             <a:endParaRPr lang="en-US"/>
           </a:p>
@@ -5724,7 +5725,7 @@
           <a:p>
             <a:fld id="{C3F78080-8D0A-4BE8-A5B4-CB115102D524}" type="datetimeFigureOut">
               <a:rPr lang="en-US" smtClean="0"/>
-              <a:t>6/6/2022</a:t>
+              <a:t>8/25/2022</a:t>
             </a:fld>
             <a:endParaRPr lang="en-US"/>
           </a:p>
@@ -6136,7 +6137,7 @@
           <a:p>
             <a:fld id="{C3F78080-8D0A-4BE8-A5B4-CB115102D524}" type="datetimeFigureOut">
               <a:rPr lang="en-US" smtClean="0"/>
-              <a:t>6/6/2022</a:t>
+              <a:t>8/25/2022</a:t>
             </a:fld>
             <a:endParaRPr lang="en-US"/>
           </a:p>
@@ -6277,7 +6278,7 @@
           <a:p>
             <a:fld id="{C3F78080-8D0A-4BE8-A5B4-CB115102D524}" type="datetimeFigureOut">
               <a:rPr lang="en-US" smtClean="0"/>
-              <a:t>6/6/2022</a:t>
+              <a:t>8/25/2022</a:t>
             </a:fld>
             <a:endParaRPr lang="en-US"/>
           </a:p>
@@ -6390,7 +6391,7 @@
           <a:p>
             <a:fld id="{C3F78080-8D0A-4BE8-A5B4-CB115102D524}" type="datetimeFigureOut">
               <a:rPr lang="en-US" smtClean="0"/>
-              <a:t>6/6/2022</a:t>
+              <a:t>8/25/2022</a:t>
             </a:fld>
             <a:endParaRPr lang="en-US"/>
           </a:p>
@@ -6701,7 +6702,7 @@
           <a:p>
             <a:fld id="{C3F78080-8D0A-4BE8-A5B4-CB115102D524}" type="datetimeFigureOut">
               <a:rPr lang="en-US" smtClean="0"/>
-              <a:t>6/6/2022</a:t>
+              <a:t>8/25/2022</a:t>
             </a:fld>
             <a:endParaRPr lang="en-US"/>
           </a:p>
@@ -6989,7 +6990,7 @@
           <a:p>
             <a:fld id="{C3F78080-8D0A-4BE8-A5B4-CB115102D524}" type="datetimeFigureOut">
               <a:rPr lang="en-US" smtClean="0"/>
-              <a:t>6/6/2022</a:t>
+              <a:t>8/25/2022</a:t>
             </a:fld>
             <a:endParaRPr lang="en-US"/>
           </a:p>
@@ -7230,7 +7231,7 @@
           <a:p>
             <a:fld id="{C3F78080-8D0A-4BE8-A5B4-CB115102D524}" type="datetimeFigureOut">
               <a:rPr lang="en-US" smtClean="0"/>
-              <a:t>6/6/2022</a:t>
+              <a:t>8/25/2022</a:t>
             </a:fld>
             <a:endParaRPr lang="en-US"/>
           </a:p>
@@ -7745,6 +7746,189 @@
 </file>
 
 <file path=ppt/slides/slide10.xml><?xml version="1.0" encoding="utf-8"?>
+<p:sld xmlns:a="http://schemas.openxmlformats.org/drawingml/2006/main" xmlns:r="http://schemas.openxmlformats.org/officeDocument/2006/relationships" xmlns:p="http://schemas.openxmlformats.org/presentationml/2006/main">
+  <p:cSld>
+    <p:spTree>
+      <p:nvGrpSpPr>
+        <p:cNvPr id="1" name=""/>
+        <p:cNvGrpSpPr/>
+        <p:nvPr/>
+      </p:nvGrpSpPr>
+      <p:grpSpPr>
+        <a:xfrm>
+          <a:off x="0" y="0"/>
+          <a:ext cx="0" cy="0"/>
+          <a:chOff x="0" y="0"/>
+          <a:chExt cx="0" cy="0"/>
+        </a:xfrm>
+      </p:grpSpPr>
+      <p:sp>
+        <p:nvSpPr>
+          <p:cNvPr id="4" name="TextBox 3">
+            <a:extLst>
+              <a:ext uri="{FF2B5EF4-FFF2-40B4-BE49-F238E27FC236}">
+                <a16:creationId xmlns:a16="http://schemas.microsoft.com/office/drawing/2014/main" id="{749C7923-C536-48CC-8E45-5459E73CC683}"/>
+              </a:ext>
+            </a:extLst>
+          </p:cNvPr>
+          <p:cNvSpPr txBox="1"/>
+          <p:nvPr/>
+        </p:nvSpPr>
+        <p:spPr>
+          <a:xfrm>
+            <a:off x="0" y="6550223"/>
+            <a:ext cx="12192000" cy="307777"/>
+          </a:xfrm>
+          <a:prstGeom prst="rect">
+            <a:avLst/>
+          </a:prstGeom>
+          <a:noFill/>
+        </p:spPr>
+        <p:txBody>
+          <a:bodyPr wrap="square" rtlCol="0">
+            <a:spAutoFit/>
+          </a:bodyPr>
+          <a:lstStyle/>
+          <a:p>
+            <a:r>
+              <a:rPr lang="en-US" sz="1400" dirty="0">
+                <a:solidFill>
+                  <a:schemeClr val="tx1">
+                    <a:lumMod val="65000"/>
+                    <a:lumOff val="35000"/>
+                  </a:schemeClr>
+                </a:solidFill>
+                <a:latin typeface="+mj-lt"/>
+                <a:ea typeface="Verdana" panose="020B0604030504040204" pitchFamily="34" charset="0"/>
+              </a:rPr>
+              <a:t>Source: Glassner, A. (2021). </a:t>
+            </a:r>
+            <a:r>
+              <a:rPr lang="en-US" sz="1400" i="1" dirty="0">
+                <a:solidFill>
+                  <a:schemeClr val="tx1">
+                    <a:lumMod val="65000"/>
+                    <a:lumOff val="35000"/>
+                  </a:schemeClr>
+                </a:solidFill>
+                <a:latin typeface="+mj-lt"/>
+                <a:ea typeface="Verdana" panose="020B0604030504040204" pitchFamily="34" charset="0"/>
+              </a:rPr>
+              <a:t>Deep learning: A visual approach</a:t>
+            </a:r>
+            <a:r>
+              <a:rPr lang="en-US" sz="1400" dirty="0">
+                <a:solidFill>
+                  <a:schemeClr val="tx1">
+                    <a:lumMod val="65000"/>
+                    <a:lumOff val="35000"/>
+                  </a:schemeClr>
+                </a:solidFill>
+                <a:latin typeface="+mj-lt"/>
+                <a:ea typeface="Verdana" panose="020B0604030504040204" pitchFamily="34" charset="0"/>
+              </a:rPr>
+              <a:t>. </a:t>
+            </a:r>
+            <a:r>
+              <a:rPr lang="en-US" sz="1400" b="0" i="0" dirty="0">
+                <a:solidFill>
+                  <a:schemeClr val="tx1">
+                    <a:lumMod val="65000"/>
+                    <a:lumOff val="35000"/>
+                  </a:schemeClr>
+                </a:solidFill>
+                <a:effectLst/>
+                <a:latin typeface="+mj-lt"/>
+                <a:ea typeface="Verdana" panose="020B0604030504040204" pitchFamily="34" charset="0"/>
+              </a:rPr>
+              <a:t>San Francisco, CA: No Starch Press. (Chapter 16)</a:t>
+            </a:r>
+            <a:endParaRPr lang="en-US" sz="1400" dirty="0">
+              <a:solidFill>
+                <a:schemeClr val="tx1">
+                  <a:lumMod val="65000"/>
+                  <a:lumOff val="35000"/>
+                </a:schemeClr>
+              </a:solidFill>
+              <a:latin typeface="+mj-lt"/>
+              <a:ea typeface="Verdana" panose="020B0604030504040204" pitchFamily="34" charset="0"/>
+            </a:endParaRPr>
+          </a:p>
+        </p:txBody>
+      </p:sp>
+      <p:pic>
+        <p:nvPicPr>
+          <p:cNvPr id="8194" name="Picture 2" descr="F16009">
+            <a:extLst>
+              <a:ext uri="{FF2B5EF4-FFF2-40B4-BE49-F238E27FC236}">
+                <a16:creationId xmlns:a16="http://schemas.microsoft.com/office/drawing/2014/main" id="{1DC4E2DC-5327-427C-AB88-2BF6CA228D3F}"/>
+              </a:ext>
+            </a:extLst>
+          </p:cNvPr>
+          <p:cNvPicPr>
+            <a:picLocks noChangeAspect="1" noChangeArrowheads="1"/>
+          </p:cNvPicPr>
+          <p:nvPr/>
+        </p:nvPicPr>
+        <p:blipFill>
+          <a:blip r:embed="rId3">
+            <a:extLst>
+              <a:ext uri="{28A0092B-C50C-407E-A947-70E740481C1C}">
+                <a14:useLocalDpi xmlns:a14="http://schemas.microsoft.com/office/drawing/2010/main" val="0"/>
+              </a:ext>
+            </a:extLst>
+          </a:blip>
+          <a:srcRect/>
+          <a:stretch>
+            <a:fillRect/>
+          </a:stretch>
+        </p:blipFill>
+        <p:spPr bwMode="auto">
+          <a:xfrm>
+            <a:off x="3971925" y="2014538"/>
+            <a:ext cx="4248150" cy="2828925"/>
+          </a:xfrm>
+          <a:prstGeom prst="rect">
+            <a:avLst/>
+          </a:prstGeom>
+          <a:noFill/>
+          <a:extLst>
+            <a:ext uri="{909E8E84-426E-40DD-AFC4-6F175D3DCCD1}">
+              <a14:hiddenFill xmlns:a14="http://schemas.microsoft.com/office/drawing/2010/main">
+                <a:solidFill>
+                  <a:srgbClr val="FFFFFF"/>
+                </a:solidFill>
+              </a14:hiddenFill>
+            </a:ext>
+          </a:extLst>
+        </p:spPr>
+      </p:pic>
+    </p:spTree>
+    <p:extLst>
+      <p:ext uri="{BB962C8B-B14F-4D97-AF65-F5344CB8AC3E}">
+        <p14:creationId xmlns:p14="http://schemas.microsoft.com/office/powerpoint/2010/main" val="970965800"/>
+      </p:ext>
+    </p:extLst>
+  </p:cSld>
+  <p:clrMapOvr>
+    <a:masterClrMapping/>
+  </p:clrMapOvr>
+  <mc:AlternateContent xmlns:mc="http://schemas.openxmlformats.org/markup-compatibility/2006" xmlns:p14="http://schemas.microsoft.com/office/powerpoint/2010/main">
+    <mc:Choice Requires="p14">
+      <p:transition spd="med" p14:dur="700">
+        <p:fade/>
+      </p:transition>
+    </mc:Choice>
+    <mc:Fallback xmlns="">
+      <p:transition spd="med">
+        <p:fade/>
+      </p:transition>
+    </mc:Fallback>
+  </mc:AlternateContent>
+</p:sld>
+</file>
+
+<file path=ppt/slides/slide11.xml><?xml version="1.0" encoding="utf-8"?>
 <p:sld xmlns:a="http://schemas.openxmlformats.org/drawingml/2006/main" xmlns:r="http://schemas.openxmlformats.org/officeDocument/2006/relationships" xmlns:p="http://schemas.openxmlformats.org/presentationml/2006/main">
   <p:cSld>
     <p:spTree>
@@ -8779,7 +8963,7 @@
 </p:sld>
 </file>
 
-<file path=ppt/slides/slide11.xml><?xml version="1.0" encoding="utf-8"?>
+<file path=ppt/slides/slide12.xml><?xml version="1.0" encoding="utf-8"?>
 <p:sld xmlns:a="http://schemas.openxmlformats.org/drawingml/2006/main" xmlns:r="http://schemas.openxmlformats.org/officeDocument/2006/relationships" xmlns:p="http://schemas.openxmlformats.org/presentationml/2006/main">
   <p:cSld>
     <p:spTree>
@@ -8913,7 +9097,7 @@
 </p:sld>
 </file>
 
-<file path=ppt/slides/slide12.xml><?xml version="1.0" encoding="utf-8"?>
+<file path=ppt/slides/slide13.xml><?xml version="1.0" encoding="utf-8"?>
 <p:sld xmlns:a="http://schemas.openxmlformats.org/drawingml/2006/main" xmlns:r="http://schemas.openxmlformats.org/officeDocument/2006/relationships" xmlns:p="http://schemas.openxmlformats.org/presentationml/2006/main">
   <p:cSld>
     <p:spTree>
@@ -9104,7 +9288,7 @@
 </p:sld>
 </file>
 
-<file path=ppt/slides/slide13.xml><?xml version="1.0" encoding="utf-8"?>
+<file path=ppt/slides/slide14.xml><?xml version="1.0" encoding="utf-8"?>
 <p:sld xmlns:a="http://schemas.openxmlformats.org/drawingml/2006/main" xmlns:r="http://schemas.openxmlformats.org/officeDocument/2006/relationships" xmlns:p="http://schemas.openxmlformats.org/presentationml/2006/main">
   <p:cSld>
     <p:spTree>
@@ -10518,7 +10702,7 @@
 </p:sld>
 </file>
 
-<file path=ppt/slides/slide14.xml><?xml version="1.0" encoding="utf-8"?>
+<file path=ppt/slides/slide15.xml><?xml version="1.0" encoding="utf-8"?>
 <p:sld xmlns:a="http://schemas.openxmlformats.org/drawingml/2006/main" xmlns:r="http://schemas.openxmlformats.org/officeDocument/2006/relationships" xmlns:p="http://schemas.openxmlformats.org/presentationml/2006/main">
   <p:cSld>
     <p:spTree>
@@ -11256,7 +11440,7 @@
 </p:sld>
 </file>
 
-<file path=ppt/slides/slide15.xml><?xml version="1.0" encoding="utf-8"?>
+<file path=ppt/slides/slide16.xml><?xml version="1.0" encoding="utf-8"?>
 <p:sld xmlns:a="http://schemas.openxmlformats.org/drawingml/2006/main" xmlns:r="http://schemas.openxmlformats.org/officeDocument/2006/relationships" xmlns:p="http://schemas.openxmlformats.org/presentationml/2006/main">
   <p:cSld>
     <p:spTree>
@@ -11545,7 +11729,7 @@
 </p:sld>
 </file>
 
-<file path=ppt/slides/slide16.xml><?xml version="1.0" encoding="utf-8"?>
+<file path=ppt/slides/slide17.xml><?xml version="1.0" encoding="utf-8"?>
 <p:sld xmlns:a="http://schemas.openxmlformats.org/drawingml/2006/main" xmlns:r="http://schemas.openxmlformats.org/officeDocument/2006/relationships" xmlns:p="http://schemas.openxmlformats.org/presentationml/2006/main">
   <p:cSld>
     <p:spTree>
@@ -11679,7 +11863,7 @@
 </p:sld>
 </file>
 
-<file path=ppt/slides/slide17.xml><?xml version="1.0" encoding="utf-8"?>
+<file path=ppt/slides/slide18.xml><?xml version="1.0" encoding="utf-8"?>
 <p:sld xmlns:a="http://schemas.openxmlformats.org/drawingml/2006/main" xmlns:r="http://schemas.openxmlformats.org/officeDocument/2006/relationships" xmlns:p="http://schemas.openxmlformats.org/presentationml/2006/main">
   <p:cSld>
     <p:spTree>
@@ -11796,7 +11980,7 @@
 </p:sld>
 </file>
 
-<file path=ppt/slides/slide18.xml><?xml version="1.0" encoding="utf-8"?>
+<file path=ppt/slides/slide19.xml><?xml version="1.0" encoding="utf-8"?>
 <p:sld xmlns:a="http://schemas.openxmlformats.org/drawingml/2006/main" xmlns:r="http://schemas.openxmlformats.org/officeDocument/2006/relationships" xmlns:p="http://schemas.openxmlformats.org/presentationml/2006/main">
   <p:cSld>
     <p:spTree>
@@ -12478,7 +12662,795 @@
 </p:sld>
 </file>
 
-<file path=ppt/slides/slide19.xml><?xml version="1.0" encoding="utf-8"?>
+<file path=ppt/slides/slide2.xml><?xml version="1.0" encoding="utf-8"?>
+<p:sld xmlns:a="http://schemas.openxmlformats.org/drawingml/2006/main" xmlns:r="http://schemas.openxmlformats.org/officeDocument/2006/relationships" xmlns:p="http://schemas.openxmlformats.org/presentationml/2006/main">
+  <p:cSld>
+    <p:spTree>
+      <p:nvGrpSpPr>
+        <p:cNvPr id="1" name=""/>
+        <p:cNvGrpSpPr/>
+        <p:nvPr/>
+      </p:nvGrpSpPr>
+      <p:grpSpPr>
+        <a:xfrm>
+          <a:off x="0" y="0"/>
+          <a:ext cx="0" cy="0"/>
+          <a:chOff x="0" y="0"/>
+          <a:chExt cx="0" cy="0"/>
+        </a:xfrm>
+      </p:grpSpPr>
+      <p:sp>
+        <p:nvSpPr>
+          <p:cNvPr id="2" name="Title 1">
+            <a:extLst>
+              <a:ext uri="{FF2B5EF4-FFF2-40B4-BE49-F238E27FC236}">
+                <a16:creationId xmlns:a16="http://schemas.microsoft.com/office/drawing/2014/main" id="{0E138177-E2EE-ACAC-A57C-F03FA29EC836}"/>
+              </a:ext>
+            </a:extLst>
+          </p:cNvPr>
+          <p:cNvSpPr>
+            <a:spLocks noGrp="1"/>
+          </p:cNvSpPr>
+          <p:nvPr>
+            <p:ph type="title"/>
+          </p:nvPr>
+        </p:nvSpPr>
+        <p:spPr/>
+        <p:txBody>
+          <a:bodyPr/>
+          <a:lstStyle/>
+          <a:p>
+            <a:r>
+              <a:rPr lang="en-US" dirty="0">
+                <a:solidFill>
+                  <a:schemeClr val="tx1">
+                    <a:lumMod val="75000"/>
+                    <a:lumOff val="25000"/>
+                  </a:schemeClr>
+                </a:solidFill>
+                <a:latin typeface="Palatino Linotype" panose="02040502050505030304" pitchFamily="18" charset="0"/>
+              </a:rPr>
+              <a:t>Lesson Overview</a:t>
+            </a:r>
+          </a:p>
+        </p:txBody>
+      </p:sp>
+      <p:sp>
+        <p:nvSpPr>
+          <p:cNvPr id="3" name="Content Placeholder 2">
+            <a:extLst>
+              <a:ext uri="{FF2B5EF4-FFF2-40B4-BE49-F238E27FC236}">
+                <a16:creationId xmlns:a16="http://schemas.microsoft.com/office/drawing/2014/main" id="{8626DB86-54B4-A1E2-6C25-C049F364ED25}"/>
+              </a:ext>
+            </a:extLst>
+          </p:cNvPr>
+          <p:cNvSpPr>
+            <a:spLocks noGrp="1"/>
+          </p:cNvSpPr>
+          <p:nvPr>
+            <p:ph idx="1"/>
+          </p:nvPr>
+        </p:nvSpPr>
+        <p:spPr>
+          <a:xfrm>
+            <a:off x="1013564" y="1825626"/>
+            <a:ext cx="10515600" cy="504215"/>
+          </a:xfrm>
+        </p:spPr>
+        <p:txBody>
+          <a:bodyPr/>
+          <a:lstStyle/>
+          <a:p>
+            <a:pPr>
+              <a:buFont typeface="Wingdings" panose="05000000000000000000" pitchFamily="2" charset="2"/>
+              <a:buChar char="Ø"/>
+            </a:pPr>
+            <a:r>
+              <a:rPr lang="en-US" dirty="0">
+                <a:solidFill>
+                  <a:schemeClr val="tx1">
+                    <a:lumMod val="75000"/>
+                    <a:lumOff val="25000"/>
+                  </a:schemeClr>
+                </a:solidFill>
+              </a:rPr>
+              <a:t> </a:t>
+            </a:r>
+            <a:r>
+              <a:rPr lang="en-US" dirty="0">
+                <a:solidFill>
+                  <a:schemeClr val="tx1">
+                    <a:lumMod val="75000"/>
+                    <a:lumOff val="25000"/>
+                  </a:schemeClr>
+                </a:solidFill>
+                <a:latin typeface="Palatino Linotype" panose="02040502050505030304" pitchFamily="18" charset="0"/>
+              </a:rPr>
+              <a:t>Learning Objective 1</a:t>
+            </a:r>
+          </a:p>
+        </p:txBody>
+      </p:sp>
+      <p:sp>
+        <p:nvSpPr>
+          <p:cNvPr id="5" name="Content Placeholder 2">
+            <a:extLst>
+              <a:ext uri="{FF2B5EF4-FFF2-40B4-BE49-F238E27FC236}">
+                <a16:creationId xmlns:a16="http://schemas.microsoft.com/office/drawing/2014/main" id="{7070644F-62DF-8674-4A8A-C2FA1554028E}"/>
+              </a:ext>
+            </a:extLst>
+          </p:cNvPr>
+          <p:cNvSpPr txBox="1">
+            <a:spLocks/>
+          </p:cNvSpPr>
+          <p:nvPr/>
+        </p:nvSpPr>
+        <p:spPr>
+          <a:xfrm>
+            <a:off x="1013564" y="2464778"/>
+            <a:ext cx="10515600" cy="504215"/>
+          </a:xfrm>
+          <a:prstGeom prst="rect">
+            <a:avLst/>
+          </a:prstGeom>
+        </p:spPr>
+        <p:txBody>
+          <a:bodyPr vert="horz" lIns="91440" tIns="45720" rIns="91440" bIns="45720" rtlCol="0">
+            <a:normAutofit/>
+          </a:bodyPr>
+          <a:lstStyle>
+            <a:lvl1pPr marL="228600" indent="-228600" algn="l" defTabSz="914400" rtl="0" eaLnBrk="1" latinLnBrk="0" hangingPunct="1">
+              <a:lnSpc>
+                <a:spcPct val="90000"/>
+              </a:lnSpc>
+              <a:spcBef>
+                <a:spcPts val="1000"/>
+              </a:spcBef>
+              <a:buFont typeface="Arial" panose="020B0604020202020204" pitchFamily="34" charset="0"/>
+              <a:buChar char="•"/>
+              <a:defRPr sz="2800" kern="1200">
+                <a:solidFill>
+                  <a:schemeClr val="tx1"/>
+                </a:solidFill>
+                <a:latin typeface="+mn-lt"/>
+                <a:ea typeface="+mn-ea"/>
+                <a:cs typeface="+mn-cs"/>
+              </a:defRPr>
+            </a:lvl1pPr>
+            <a:lvl2pPr marL="685800" indent="-228600" algn="l" defTabSz="914400" rtl="0" eaLnBrk="1" latinLnBrk="0" hangingPunct="1">
+              <a:lnSpc>
+                <a:spcPct val="90000"/>
+              </a:lnSpc>
+              <a:spcBef>
+                <a:spcPts val="500"/>
+              </a:spcBef>
+              <a:buFont typeface="Arial" panose="020B0604020202020204" pitchFamily="34" charset="0"/>
+              <a:buChar char="•"/>
+              <a:defRPr sz="2400" kern="1200">
+                <a:solidFill>
+                  <a:schemeClr val="tx1"/>
+                </a:solidFill>
+                <a:latin typeface="+mn-lt"/>
+                <a:ea typeface="+mn-ea"/>
+                <a:cs typeface="+mn-cs"/>
+              </a:defRPr>
+            </a:lvl2pPr>
+            <a:lvl3pPr marL="1143000" indent="-228600" algn="l" defTabSz="914400" rtl="0" eaLnBrk="1" latinLnBrk="0" hangingPunct="1">
+              <a:lnSpc>
+                <a:spcPct val="90000"/>
+              </a:lnSpc>
+              <a:spcBef>
+                <a:spcPts val="500"/>
+              </a:spcBef>
+              <a:buFont typeface="Arial" panose="020B0604020202020204" pitchFamily="34" charset="0"/>
+              <a:buChar char="•"/>
+              <a:defRPr sz="2000" kern="1200">
+                <a:solidFill>
+                  <a:schemeClr val="tx1"/>
+                </a:solidFill>
+                <a:latin typeface="+mn-lt"/>
+                <a:ea typeface="+mn-ea"/>
+                <a:cs typeface="+mn-cs"/>
+              </a:defRPr>
+            </a:lvl3pPr>
+            <a:lvl4pPr marL="1600200" indent="-228600" algn="l" defTabSz="914400" rtl="0" eaLnBrk="1" latinLnBrk="0" hangingPunct="1">
+              <a:lnSpc>
+                <a:spcPct val="90000"/>
+              </a:lnSpc>
+              <a:spcBef>
+                <a:spcPts val="500"/>
+              </a:spcBef>
+              <a:buFont typeface="Arial" panose="020B0604020202020204" pitchFamily="34" charset="0"/>
+              <a:buChar char="•"/>
+              <a:defRPr sz="1800" kern="1200">
+                <a:solidFill>
+                  <a:schemeClr val="tx1"/>
+                </a:solidFill>
+                <a:latin typeface="+mn-lt"/>
+                <a:ea typeface="+mn-ea"/>
+                <a:cs typeface="+mn-cs"/>
+              </a:defRPr>
+            </a:lvl4pPr>
+            <a:lvl5pPr marL="2057400" indent="-228600" algn="l" defTabSz="914400" rtl="0" eaLnBrk="1" latinLnBrk="0" hangingPunct="1">
+              <a:lnSpc>
+                <a:spcPct val="90000"/>
+              </a:lnSpc>
+              <a:spcBef>
+                <a:spcPts val="500"/>
+              </a:spcBef>
+              <a:buFont typeface="Arial" panose="020B0604020202020204" pitchFamily="34" charset="0"/>
+              <a:buChar char="•"/>
+              <a:defRPr sz="1800" kern="1200">
+                <a:solidFill>
+                  <a:schemeClr val="tx1"/>
+                </a:solidFill>
+                <a:latin typeface="+mn-lt"/>
+                <a:ea typeface="+mn-ea"/>
+                <a:cs typeface="+mn-cs"/>
+              </a:defRPr>
+            </a:lvl5pPr>
+            <a:lvl6pPr marL="2514600" indent="-228600" algn="l" defTabSz="914400" rtl="0" eaLnBrk="1" latinLnBrk="0" hangingPunct="1">
+              <a:lnSpc>
+                <a:spcPct val="90000"/>
+              </a:lnSpc>
+              <a:spcBef>
+                <a:spcPts val="500"/>
+              </a:spcBef>
+              <a:buFont typeface="Arial" panose="020B0604020202020204" pitchFamily="34" charset="0"/>
+              <a:buChar char="•"/>
+              <a:defRPr sz="1800" kern="1200">
+                <a:solidFill>
+                  <a:schemeClr val="tx1"/>
+                </a:solidFill>
+                <a:latin typeface="+mn-lt"/>
+                <a:ea typeface="+mn-ea"/>
+                <a:cs typeface="+mn-cs"/>
+              </a:defRPr>
+            </a:lvl6pPr>
+            <a:lvl7pPr marL="2971800" indent="-228600" algn="l" defTabSz="914400" rtl="0" eaLnBrk="1" latinLnBrk="0" hangingPunct="1">
+              <a:lnSpc>
+                <a:spcPct val="90000"/>
+              </a:lnSpc>
+              <a:spcBef>
+                <a:spcPts val="500"/>
+              </a:spcBef>
+              <a:buFont typeface="Arial" panose="020B0604020202020204" pitchFamily="34" charset="0"/>
+              <a:buChar char="•"/>
+              <a:defRPr sz="1800" kern="1200">
+                <a:solidFill>
+                  <a:schemeClr val="tx1"/>
+                </a:solidFill>
+                <a:latin typeface="+mn-lt"/>
+                <a:ea typeface="+mn-ea"/>
+                <a:cs typeface="+mn-cs"/>
+              </a:defRPr>
+            </a:lvl7pPr>
+            <a:lvl8pPr marL="3429000" indent="-228600" algn="l" defTabSz="914400" rtl="0" eaLnBrk="1" latinLnBrk="0" hangingPunct="1">
+              <a:lnSpc>
+                <a:spcPct val="90000"/>
+              </a:lnSpc>
+              <a:spcBef>
+                <a:spcPts val="500"/>
+              </a:spcBef>
+              <a:buFont typeface="Arial" panose="020B0604020202020204" pitchFamily="34" charset="0"/>
+              <a:buChar char="•"/>
+              <a:defRPr sz="1800" kern="1200">
+                <a:solidFill>
+                  <a:schemeClr val="tx1"/>
+                </a:solidFill>
+                <a:latin typeface="+mn-lt"/>
+                <a:ea typeface="+mn-ea"/>
+                <a:cs typeface="+mn-cs"/>
+              </a:defRPr>
+            </a:lvl8pPr>
+            <a:lvl9pPr marL="3886200" indent="-228600" algn="l" defTabSz="914400" rtl="0" eaLnBrk="1" latinLnBrk="0" hangingPunct="1">
+              <a:lnSpc>
+                <a:spcPct val="90000"/>
+              </a:lnSpc>
+              <a:spcBef>
+                <a:spcPts val="500"/>
+              </a:spcBef>
+              <a:buFont typeface="Arial" panose="020B0604020202020204" pitchFamily="34" charset="0"/>
+              <a:buChar char="•"/>
+              <a:defRPr sz="1800" kern="1200">
+                <a:solidFill>
+                  <a:schemeClr val="tx1"/>
+                </a:solidFill>
+                <a:latin typeface="+mn-lt"/>
+                <a:ea typeface="+mn-ea"/>
+                <a:cs typeface="+mn-cs"/>
+              </a:defRPr>
+            </a:lvl9pPr>
+          </a:lstStyle>
+          <a:p>
+            <a:pPr>
+              <a:buFont typeface="Wingdings" panose="05000000000000000000" pitchFamily="2" charset="2"/>
+              <a:buChar char="Ø"/>
+            </a:pPr>
+            <a:r>
+              <a:rPr lang="en-US" dirty="0">
+                <a:solidFill>
+                  <a:schemeClr val="tx1">
+                    <a:lumMod val="75000"/>
+                    <a:lumOff val="25000"/>
+                  </a:schemeClr>
+                </a:solidFill>
+              </a:rPr>
+              <a:t> </a:t>
+            </a:r>
+            <a:r>
+              <a:rPr lang="en-US" dirty="0">
+                <a:solidFill>
+                  <a:schemeClr val="tx1">
+                    <a:lumMod val="75000"/>
+                    <a:lumOff val="25000"/>
+                  </a:schemeClr>
+                </a:solidFill>
+                <a:latin typeface="Palatino Linotype" panose="02040502050505030304" pitchFamily="18" charset="0"/>
+              </a:rPr>
+              <a:t>Learning Objective 1</a:t>
+            </a:r>
+          </a:p>
+        </p:txBody>
+      </p:sp>
+      <p:sp>
+        <p:nvSpPr>
+          <p:cNvPr id="6" name="Content Placeholder 2">
+            <a:extLst>
+              <a:ext uri="{FF2B5EF4-FFF2-40B4-BE49-F238E27FC236}">
+                <a16:creationId xmlns:a16="http://schemas.microsoft.com/office/drawing/2014/main" id="{FF2490E1-D7A0-7027-6DCC-60BB6819CD9E}"/>
+              </a:ext>
+            </a:extLst>
+          </p:cNvPr>
+          <p:cNvSpPr txBox="1">
+            <a:spLocks/>
+          </p:cNvSpPr>
+          <p:nvPr/>
+        </p:nvSpPr>
+        <p:spPr>
+          <a:xfrm>
+            <a:off x="1013564" y="3103930"/>
+            <a:ext cx="10515600" cy="504215"/>
+          </a:xfrm>
+          <a:prstGeom prst="rect">
+            <a:avLst/>
+          </a:prstGeom>
+        </p:spPr>
+        <p:txBody>
+          <a:bodyPr vert="horz" lIns="91440" tIns="45720" rIns="91440" bIns="45720" rtlCol="0">
+            <a:normAutofit/>
+          </a:bodyPr>
+          <a:lstStyle>
+            <a:lvl1pPr marL="228600" indent="-228600" algn="l" defTabSz="914400" rtl="0" eaLnBrk="1" latinLnBrk="0" hangingPunct="1">
+              <a:lnSpc>
+                <a:spcPct val="90000"/>
+              </a:lnSpc>
+              <a:spcBef>
+                <a:spcPts val="1000"/>
+              </a:spcBef>
+              <a:buFont typeface="Arial" panose="020B0604020202020204" pitchFamily="34" charset="0"/>
+              <a:buChar char="•"/>
+              <a:defRPr sz="2800" kern="1200">
+                <a:solidFill>
+                  <a:schemeClr val="tx1"/>
+                </a:solidFill>
+                <a:latin typeface="+mn-lt"/>
+                <a:ea typeface="+mn-ea"/>
+                <a:cs typeface="+mn-cs"/>
+              </a:defRPr>
+            </a:lvl1pPr>
+            <a:lvl2pPr marL="685800" indent="-228600" algn="l" defTabSz="914400" rtl="0" eaLnBrk="1" latinLnBrk="0" hangingPunct="1">
+              <a:lnSpc>
+                <a:spcPct val="90000"/>
+              </a:lnSpc>
+              <a:spcBef>
+                <a:spcPts val="500"/>
+              </a:spcBef>
+              <a:buFont typeface="Arial" panose="020B0604020202020204" pitchFamily="34" charset="0"/>
+              <a:buChar char="•"/>
+              <a:defRPr sz="2400" kern="1200">
+                <a:solidFill>
+                  <a:schemeClr val="tx1"/>
+                </a:solidFill>
+                <a:latin typeface="+mn-lt"/>
+                <a:ea typeface="+mn-ea"/>
+                <a:cs typeface="+mn-cs"/>
+              </a:defRPr>
+            </a:lvl2pPr>
+            <a:lvl3pPr marL="1143000" indent="-228600" algn="l" defTabSz="914400" rtl="0" eaLnBrk="1" latinLnBrk="0" hangingPunct="1">
+              <a:lnSpc>
+                <a:spcPct val="90000"/>
+              </a:lnSpc>
+              <a:spcBef>
+                <a:spcPts val="500"/>
+              </a:spcBef>
+              <a:buFont typeface="Arial" panose="020B0604020202020204" pitchFamily="34" charset="0"/>
+              <a:buChar char="•"/>
+              <a:defRPr sz="2000" kern="1200">
+                <a:solidFill>
+                  <a:schemeClr val="tx1"/>
+                </a:solidFill>
+                <a:latin typeface="+mn-lt"/>
+                <a:ea typeface="+mn-ea"/>
+                <a:cs typeface="+mn-cs"/>
+              </a:defRPr>
+            </a:lvl3pPr>
+            <a:lvl4pPr marL="1600200" indent="-228600" algn="l" defTabSz="914400" rtl="0" eaLnBrk="1" latinLnBrk="0" hangingPunct="1">
+              <a:lnSpc>
+                <a:spcPct val="90000"/>
+              </a:lnSpc>
+              <a:spcBef>
+                <a:spcPts val="500"/>
+              </a:spcBef>
+              <a:buFont typeface="Arial" panose="020B0604020202020204" pitchFamily="34" charset="0"/>
+              <a:buChar char="•"/>
+              <a:defRPr sz="1800" kern="1200">
+                <a:solidFill>
+                  <a:schemeClr val="tx1"/>
+                </a:solidFill>
+                <a:latin typeface="+mn-lt"/>
+                <a:ea typeface="+mn-ea"/>
+                <a:cs typeface="+mn-cs"/>
+              </a:defRPr>
+            </a:lvl4pPr>
+            <a:lvl5pPr marL="2057400" indent="-228600" algn="l" defTabSz="914400" rtl="0" eaLnBrk="1" latinLnBrk="0" hangingPunct="1">
+              <a:lnSpc>
+                <a:spcPct val="90000"/>
+              </a:lnSpc>
+              <a:spcBef>
+                <a:spcPts val="500"/>
+              </a:spcBef>
+              <a:buFont typeface="Arial" panose="020B0604020202020204" pitchFamily="34" charset="0"/>
+              <a:buChar char="•"/>
+              <a:defRPr sz="1800" kern="1200">
+                <a:solidFill>
+                  <a:schemeClr val="tx1"/>
+                </a:solidFill>
+                <a:latin typeface="+mn-lt"/>
+                <a:ea typeface="+mn-ea"/>
+                <a:cs typeface="+mn-cs"/>
+              </a:defRPr>
+            </a:lvl5pPr>
+            <a:lvl6pPr marL="2514600" indent="-228600" algn="l" defTabSz="914400" rtl="0" eaLnBrk="1" latinLnBrk="0" hangingPunct="1">
+              <a:lnSpc>
+                <a:spcPct val="90000"/>
+              </a:lnSpc>
+              <a:spcBef>
+                <a:spcPts val="500"/>
+              </a:spcBef>
+              <a:buFont typeface="Arial" panose="020B0604020202020204" pitchFamily="34" charset="0"/>
+              <a:buChar char="•"/>
+              <a:defRPr sz="1800" kern="1200">
+                <a:solidFill>
+                  <a:schemeClr val="tx1"/>
+                </a:solidFill>
+                <a:latin typeface="+mn-lt"/>
+                <a:ea typeface="+mn-ea"/>
+                <a:cs typeface="+mn-cs"/>
+              </a:defRPr>
+            </a:lvl6pPr>
+            <a:lvl7pPr marL="2971800" indent="-228600" algn="l" defTabSz="914400" rtl="0" eaLnBrk="1" latinLnBrk="0" hangingPunct="1">
+              <a:lnSpc>
+                <a:spcPct val="90000"/>
+              </a:lnSpc>
+              <a:spcBef>
+                <a:spcPts val="500"/>
+              </a:spcBef>
+              <a:buFont typeface="Arial" panose="020B0604020202020204" pitchFamily="34" charset="0"/>
+              <a:buChar char="•"/>
+              <a:defRPr sz="1800" kern="1200">
+                <a:solidFill>
+                  <a:schemeClr val="tx1"/>
+                </a:solidFill>
+                <a:latin typeface="+mn-lt"/>
+                <a:ea typeface="+mn-ea"/>
+                <a:cs typeface="+mn-cs"/>
+              </a:defRPr>
+            </a:lvl7pPr>
+            <a:lvl8pPr marL="3429000" indent="-228600" algn="l" defTabSz="914400" rtl="0" eaLnBrk="1" latinLnBrk="0" hangingPunct="1">
+              <a:lnSpc>
+                <a:spcPct val="90000"/>
+              </a:lnSpc>
+              <a:spcBef>
+                <a:spcPts val="500"/>
+              </a:spcBef>
+              <a:buFont typeface="Arial" panose="020B0604020202020204" pitchFamily="34" charset="0"/>
+              <a:buChar char="•"/>
+              <a:defRPr sz="1800" kern="1200">
+                <a:solidFill>
+                  <a:schemeClr val="tx1"/>
+                </a:solidFill>
+                <a:latin typeface="+mn-lt"/>
+                <a:ea typeface="+mn-ea"/>
+                <a:cs typeface="+mn-cs"/>
+              </a:defRPr>
+            </a:lvl8pPr>
+            <a:lvl9pPr marL="3886200" indent="-228600" algn="l" defTabSz="914400" rtl="0" eaLnBrk="1" latinLnBrk="0" hangingPunct="1">
+              <a:lnSpc>
+                <a:spcPct val="90000"/>
+              </a:lnSpc>
+              <a:spcBef>
+                <a:spcPts val="500"/>
+              </a:spcBef>
+              <a:buFont typeface="Arial" panose="020B0604020202020204" pitchFamily="34" charset="0"/>
+              <a:buChar char="•"/>
+              <a:defRPr sz="1800" kern="1200">
+                <a:solidFill>
+                  <a:schemeClr val="tx1"/>
+                </a:solidFill>
+                <a:latin typeface="+mn-lt"/>
+                <a:ea typeface="+mn-ea"/>
+                <a:cs typeface="+mn-cs"/>
+              </a:defRPr>
+            </a:lvl9pPr>
+          </a:lstStyle>
+          <a:p>
+            <a:pPr>
+              <a:buFont typeface="Wingdings" panose="05000000000000000000" pitchFamily="2" charset="2"/>
+              <a:buChar char="Ø"/>
+            </a:pPr>
+            <a:r>
+              <a:rPr lang="en-US" dirty="0">
+                <a:solidFill>
+                  <a:schemeClr val="tx1">
+                    <a:lumMod val="75000"/>
+                    <a:lumOff val="25000"/>
+                  </a:schemeClr>
+                </a:solidFill>
+              </a:rPr>
+              <a:t> </a:t>
+            </a:r>
+            <a:r>
+              <a:rPr lang="en-US" dirty="0">
+                <a:solidFill>
+                  <a:schemeClr val="tx1">
+                    <a:lumMod val="75000"/>
+                    <a:lumOff val="25000"/>
+                  </a:schemeClr>
+                </a:solidFill>
+                <a:latin typeface="Palatino Linotype" panose="02040502050505030304" pitchFamily="18" charset="0"/>
+              </a:rPr>
+              <a:t>Learning Objective 1</a:t>
+            </a:r>
+          </a:p>
+        </p:txBody>
+      </p:sp>
+      <p:sp>
+        <p:nvSpPr>
+          <p:cNvPr id="7" name="Content Placeholder 2">
+            <a:extLst>
+              <a:ext uri="{FF2B5EF4-FFF2-40B4-BE49-F238E27FC236}">
+                <a16:creationId xmlns:a16="http://schemas.microsoft.com/office/drawing/2014/main" id="{6D3279E5-D518-B484-9FCF-B12663A4E8FF}"/>
+              </a:ext>
+            </a:extLst>
+          </p:cNvPr>
+          <p:cNvSpPr txBox="1">
+            <a:spLocks/>
+          </p:cNvSpPr>
+          <p:nvPr/>
+        </p:nvSpPr>
+        <p:spPr>
+          <a:xfrm>
+            <a:off x="1013564" y="3743082"/>
+            <a:ext cx="10515600" cy="504215"/>
+          </a:xfrm>
+          <a:prstGeom prst="rect">
+            <a:avLst/>
+          </a:prstGeom>
+        </p:spPr>
+        <p:txBody>
+          <a:bodyPr vert="horz" lIns="91440" tIns="45720" rIns="91440" bIns="45720" rtlCol="0">
+            <a:normAutofit/>
+          </a:bodyPr>
+          <a:lstStyle>
+            <a:lvl1pPr marL="228600" indent="-228600" algn="l" defTabSz="914400" rtl="0" eaLnBrk="1" latinLnBrk="0" hangingPunct="1">
+              <a:lnSpc>
+                <a:spcPct val="90000"/>
+              </a:lnSpc>
+              <a:spcBef>
+                <a:spcPts val="1000"/>
+              </a:spcBef>
+              <a:buFont typeface="Arial" panose="020B0604020202020204" pitchFamily="34" charset="0"/>
+              <a:buChar char="•"/>
+              <a:defRPr sz="2800" kern="1200">
+                <a:solidFill>
+                  <a:schemeClr val="tx1"/>
+                </a:solidFill>
+                <a:latin typeface="+mn-lt"/>
+                <a:ea typeface="+mn-ea"/>
+                <a:cs typeface="+mn-cs"/>
+              </a:defRPr>
+            </a:lvl1pPr>
+            <a:lvl2pPr marL="685800" indent="-228600" algn="l" defTabSz="914400" rtl="0" eaLnBrk="1" latinLnBrk="0" hangingPunct="1">
+              <a:lnSpc>
+                <a:spcPct val="90000"/>
+              </a:lnSpc>
+              <a:spcBef>
+                <a:spcPts val="500"/>
+              </a:spcBef>
+              <a:buFont typeface="Arial" panose="020B0604020202020204" pitchFamily="34" charset="0"/>
+              <a:buChar char="•"/>
+              <a:defRPr sz="2400" kern="1200">
+                <a:solidFill>
+                  <a:schemeClr val="tx1"/>
+                </a:solidFill>
+                <a:latin typeface="+mn-lt"/>
+                <a:ea typeface="+mn-ea"/>
+                <a:cs typeface="+mn-cs"/>
+              </a:defRPr>
+            </a:lvl2pPr>
+            <a:lvl3pPr marL="1143000" indent="-228600" algn="l" defTabSz="914400" rtl="0" eaLnBrk="1" latinLnBrk="0" hangingPunct="1">
+              <a:lnSpc>
+                <a:spcPct val="90000"/>
+              </a:lnSpc>
+              <a:spcBef>
+                <a:spcPts val="500"/>
+              </a:spcBef>
+              <a:buFont typeface="Arial" panose="020B0604020202020204" pitchFamily="34" charset="0"/>
+              <a:buChar char="•"/>
+              <a:defRPr sz="2000" kern="1200">
+                <a:solidFill>
+                  <a:schemeClr val="tx1"/>
+                </a:solidFill>
+                <a:latin typeface="+mn-lt"/>
+                <a:ea typeface="+mn-ea"/>
+                <a:cs typeface="+mn-cs"/>
+              </a:defRPr>
+            </a:lvl3pPr>
+            <a:lvl4pPr marL="1600200" indent="-228600" algn="l" defTabSz="914400" rtl="0" eaLnBrk="1" latinLnBrk="0" hangingPunct="1">
+              <a:lnSpc>
+                <a:spcPct val="90000"/>
+              </a:lnSpc>
+              <a:spcBef>
+                <a:spcPts val="500"/>
+              </a:spcBef>
+              <a:buFont typeface="Arial" panose="020B0604020202020204" pitchFamily="34" charset="0"/>
+              <a:buChar char="•"/>
+              <a:defRPr sz="1800" kern="1200">
+                <a:solidFill>
+                  <a:schemeClr val="tx1"/>
+                </a:solidFill>
+                <a:latin typeface="+mn-lt"/>
+                <a:ea typeface="+mn-ea"/>
+                <a:cs typeface="+mn-cs"/>
+              </a:defRPr>
+            </a:lvl4pPr>
+            <a:lvl5pPr marL="2057400" indent="-228600" algn="l" defTabSz="914400" rtl="0" eaLnBrk="1" latinLnBrk="0" hangingPunct="1">
+              <a:lnSpc>
+                <a:spcPct val="90000"/>
+              </a:lnSpc>
+              <a:spcBef>
+                <a:spcPts val="500"/>
+              </a:spcBef>
+              <a:buFont typeface="Arial" panose="020B0604020202020204" pitchFamily="34" charset="0"/>
+              <a:buChar char="•"/>
+              <a:defRPr sz="1800" kern="1200">
+                <a:solidFill>
+                  <a:schemeClr val="tx1"/>
+                </a:solidFill>
+                <a:latin typeface="+mn-lt"/>
+                <a:ea typeface="+mn-ea"/>
+                <a:cs typeface="+mn-cs"/>
+              </a:defRPr>
+            </a:lvl5pPr>
+            <a:lvl6pPr marL="2514600" indent="-228600" algn="l" defTabSz="914400" rtl="0" eaLnBrk="1" latinLnBrk="0" hangingPunct="1">
+              <a:lnSpc>
+                <a:spcPct val="90000"/>
+              </a:lnSpc>
+              <a:spcBef>
+                <a:spcPts val="500"/>
+              </a:spcBef>
+              <a:buFont typeface="Arial" panose="020B0604020202020204" pitchFamily="34" charset="0"/>
+              <a:buChar char="•"/>
+              <a:defRPr sz="1800" kern="1200">
+                <a:solidFill>
+                  <a:schemeClr val="tx1"/>
+                </a:solidFill>
+                <a:latin typeface="+mn-lt"/>
+                <a:ea typeface="+mn-ea"/>
+                <a:cs typeface="+mn-cs"/>
+              </a:defRPr>
+            </a:lvl6pPr>
+            <a:lvl7pPr marL="2971800" indent="-228600" algn="l" defTabSz="914400" rtl="0" eaLnBrk="1" latinLnBrk="0" hangingPunct="1">
+              <a:lnSpc>
+                <a:spcPct val="90000"/>
+              </a:lnSpc>
+              <a:spcBef>
+                <a:spcPts val="500"/>
+              </a:spcBef>
+              <a:buFont typeface="Arial" panose="020B0604020202020204" pitchFamily="34" charset="0"/>
+              <a:buChar char="•"/>
+              <a:defRPr sz="1800" kern="1200">
+                <a:solidFill>
+                  <a:schemeClr val="tx1"/>
+                </a:solidFill>
+                <a:latin typeface="+mn-lt"/>
+                <a:ea typeface="+mn-ea"/>
+                <a:cs typeface="+mn-cs"/>
+              </a:defRPr>
+            </a:lvl7pPr>
+            <a:lvl8pPr marL="3429000" indent="-228600" algn="l" defTabSz="914400" rtl="0" eaLnBrk="1" latinLnBrk="0" hangingPunct="1">
+              <a:lnSpc>
+                <a:spcPct val="90000"/>
+              </a:lnSpc>
+              <a:spcBef>
+                <a:spcPts val="500"/>
+              </a:spcBef>
+              <a:buFont typeface="Arial" panose="020B0604020202020204" pitchFamily="34" charset="0"/>
+              <a:buChar char="•"/>
+              <a:defRPr sz="1800" kern="1200">
+                <a:solidFill>
+                  <a:schemeClr val="tx1"/>
+                </a:solidFill>
+                <a:latin typeface="+mn-lt"/>
+                <a:ea typeface="+mn-ea"/>
+                <a:cs typeface="+mn-cs"/>
+              </a:defRPr>
+            </a:lvl8pPr>
+            <a:lvl9pPr marL="3886200" indent="-228600" algn="l" defTabSz="914400" rtl="0" eaLnBrk="1" latinLnBrk="0" hangingPunct="1">
+              <a:lnSpc>
+                <a:spcPct val="90000"/>
+              </a:lnSpc>
+              <a:spcBef>
+                <a:spcPts val="500"/>
+              </a:spcBef>
+              <a:buFont typeface="Arial" panose="020B0604020202020204" pitchFamily="34" charset="0"/>
+              <a:buChar char="•"/>
+              <a:defRPr sz="1800" kern="1200">
+                <a:solidFill>
+                  <a:schemeClr val="tx1"/>
+                </a:solidFill>
+                <a:latin typeface="+mn-lt"/>
+                <a:ea typeface="+mn-ea"/>
+                <a:cs typeface="+mn-cs"/>
+              </a:defRPr>
+            </a:lvl9pPr>
+          </a:lstStyle>
+          <a:p>
+            <a:pPr>
+              <a:buFont typeface="Wingdings" panose="05000000000000000000" pitchFamily="2" charset="2"/>
+              <a:buChar char="Ø"/>
+            </a:pPr>
+            <a:r>
+              <a:rPr lang="en-US" dirty="0">
+                <a:solidFill>
+                  <a:schemeClr val="tx1">
+                    <a:lumMod val="75000"/>
+                    <a:lumOff val="25000"/>
+                  </a:schemeClr>
+                </a:solidFill>
+              </a:rPr>
+              <a:t> </a:t>
+            </a:r>
+            <a:r>
+              <a:rPr lang="en-US" dirty="0">
+                <a:solidFill>
+                  <a:schemeClr val="tx1">
+                    <a:lumMod val="75000"/>
+                    <a:lumOff val="25000"/>
+                  </a:schemeClr>
+                </a:solidFill>
+                <a:latin typeface="Palatino Linotype" panose="02040502050505030304" pitchFamily="18" charset="0"/>
+              </a:rPr>
+              <a:t>Learning Objective 1</a:t>
+            </a:r>
+          </a:p>
+        </p:txBody>
+      </p:sp>
+    </p:spTree>
+    <p:extLst>
+      <p:ext uri="{BB962C8B-B14F-4D97-AF65-F5344CB8AC3E}">
+        <p14:creationId xmlns:p14="http://schemas.microsoft.com/office/powerpoint/2010/main" val="1416141381"/>
+      </p:ext>
+    </p:extLst>
+  </p:cSld>
+  <p:clrMapOvr>
+    <a:masterClrMapping/>
+  </p:clrMapOvr>
+</p:sld>
+</file>
+
+<file path=ppt/slides/slide20.xml><?xml version="1.0" encoding="utf-8"?>
 <p:sld xmlns:a="http://schemas.openxmlformats.org/drawingml/2006/main" xmlns:r="http://schemas.openxmlformats.org/officeDocument/2006/relationships" xmlns:p="http://schemas.openxmlformats.org/presentationml/2006/main">
   <p:cSld>
     <p:spTree>
@@ -12632,79 +13604,7 @@
 </p:sld>
 </file>
 
-<file path=ppt/slides/slide2.xml><?xml version="1.0" encoding="utf-8"?>
-<p:sld xmlns:a="http://schemas.openxmlformats.org/drawingml/2006/main" xmlns:r="http://schemas.openxmlformats.org/officeDocument/2006/relationships" xmlns:p="http://schemas.openxmlformats.org/presentationml/2006/main">
-  <p:cSld>
-    <p:spTree>
-      <p:nvGrpSpPr>
-        <p:cNvPr id="1" name=""/>
-        <p:cNvGrpSpPr/>
-        <p:nvPr/>
-      </p:nvGrpSpPr>
-      <p:grpSpPr>
-        <a:xfrm>
-          <a:off x="0" y="0"/>
-          <a:ext cx="0" cy="0"/>
-          <a:chOff x="0" y="0"/>
-          <a:chExt cx="0" cy="0"/>
-        </a:xfrm>
-      </p:grpSpPr>
-      <p:pic>
-        <p:nvPicPr>
-          <p:cNvPr id="3" name="Picture 2">
-            <a:extLst>
-              <a:ext uri="{FF2B5EF4-FFF2-40B4-BE49-F238E27FC236}">
-                <a16:creationId xmlns:a16="http://schemas.microsoft.com/office/drawing/2014/main" id="{DEFE0AA7-599F-47D5-8772-72921880F8E6}"/>
-              </a:ext>
-            </a:extLst>
-          </p:cNvPr>
-          <p:cNvPicPr>
-            <a:picLocks noChangeAspect="1"/>
-          </p:cNvPicPr>
-          <p:nvPr/>
-        </p:nvPicPr>
-        <p:blipFill>
-          <a:blip r:embed="rId3"/>
-          <a:stretch>
-            <a:fillRect/>
-          </a:stretch>
-        </p:blipFill>
-        <p:spPr>
-          <a:xfrm>
-            <a:off x="1581150" y="1395412"/>
-            <a:ext cx="9029700" cy="4067175"/>
-          </a:xfrm>
-          <a:prstGeom prst="rect">
-            <a:avLst/>
-          </a:prstGeom>
-        </p:spPr>
-      </p:pic>
-    </p:spTree>
-    <p:extLst>
-      <p:ext uri="{BB962C8B-B14F-4D97-AF65-F5344CB8AC3E}">
-        <p14:creationId xmlns:p14="http://schemas.microsoft.com/office/powerpoint/2010/main" val="1777948658"/>
-      </p:ext>
-    </p:extLst>
-  </p:cSld>
-  <p:clrMapOvr>
-    <a:masterClrMapping/>
-  </p:clrMapOvr>
-  <mc:AlternateContent xmlns:mc="http://schemas.openxmlformats.org/markup-compatibility/2006" xmlns:p14="http://schemas.microsoft.com/office/powerpoint/2010/main">
-    <mc:Choice Requires="p14">
-      <p:transition spd="med" p14:dur="700">
-        <p:fade/>
-      </p:transition>
-    </mc:Choice>
-    <mc:Fallback xmlns="">
-      <p:transition spd="med">
-        <p:fade/>
-      </p:transition>
-    </mc:Fallback>
-  </mc:AlternateContent>
-</p:sld>
-</file>
-
-<file path=ppt/slides/slide20.xml><?xml version="1.0" encoding="utf-8"?>
+<file path=ppt/slides/slide21.xml><?xml version="1.0" encoding="utf-8"?>
 <p:sld xmlns:a="http://schemas.openxmlformats.org/drawingml/2006/main" xmlns:r="http://schemas.openxmlformats.org/officeDocument/2006/relationships" xmlns:p="http://schemas.openxmlformats.org/presentationml/2006/main">
   <p:cSld>
     <p:spTree>
@@ -13386,7 +14286,7 @@
 </p:sld>
 </file>
 
-<file path=ppt/slides/slide21.xml><?xml version="1.0" encoding="utf-8"?>
+<file path=ppt/slides/slide22.xml><?xml version="1.0" encoding="utf-8"?>
 <p:sld xmlns:a="http://schemas.openxmlformats.org/drawingml/2006/main" xmlns:r="http://schemas.openxmlformats.org/officeDocument/2006/relationships" xmlns:p="http://schemas.openxmlformats.org/presentationml/2006/main">
   <p:cSld>
     <p:spTree>
@@ -13503,7 +14403,7 @@
 </p:sld>
 </file>
 
-<file path=ppt/slides/slide22.xml><?xml version="1.0" encoding="utf-8"?>
+<file path=ppt/slides/slide23.xml><?xml version="1.0" encoding="utf-8"?>
 <p:sld xmlns:a="http://schemas.openxmlformats.org/drawingml/2006/main" xmlns:r="http://schemas.openxmlformats.org/officeDocument/2006/relationships" xmlns:p="http://schemas.openxmlformats.org/presentationml/2006/main">
   <p:cSld>
     <p:spTree>
@@ -13575,7 +14475,7 @@
 </p:sld>
 </file>
 
-<file path=ppt/slides/slide23.xml><?xml version="1.0" encoding="utf-8"?>
+<file path=ppt/slides/slide24.xml><?xml version="1.0" encoding="utf-8"?>
 <p:sld xmlns:a="http://schemas.openxmlformats.org/drawingml/2006/main" xmlns:r="http://schemas.openxmlformats.org/officeDocument/2006/relationships" xmlns:p="http://schemas.openxmlformats.org/presentationml/2006/main">
   <p:cSld>
     <p:spTree>
@@ -13701,7 +14601,7 @@
 </p:sld>
 </file>
 
-<file path=ppt/slides/slide24.xml><?xml version="1.0" encoding="utf-8"?>
+<file path=ppt/slides/slide25.xml><?xml version="1.0" encoding="utf-8"?>
 <p:sld xmlns:a="http://schemas.openxmlformats.org/drawingml/2006/main" xmlns:r="http://schemas.openxmlformats.org/officeDocument/2006/relationships" xmlns:p="http://schemas.openxmlformats.org/presentationml/2006/main">
   <p:cSld>
     <p:spTree>
@@ -13871,73 +14771,6 @@
     <p:extLst>
       <p:ext uri="{BB962C8B-B14F-4D97-AF65-F5344CB8AC3E}">
         <p14:creationId xmlns:p14="http://schemas.microsoft.com/office/powerpoint/2010/main" val="4096204018"/>
-      </p:ext>
-    </p:extLst>
-  </p:cSld>
-  <p:clrMapOvr>
-    <a:masterClrMapping/>
-  </p:clrMapOvr>
-  <mc:AlternateContent xmlns:mc="http://schemas.openxmlformats.org/markup-compatibility/2006" xmlns:p14="http://schemas.microsoft.com/office/powerpoint/2010/main">
-    <mc:Choice Requires="p14">
-      <p:transition spd="med" p14:dur="700">
-        <p:fade/>
-      </p:transition>
-    </mc:Choice>
-    <mc:Fallback xmlns="">
-      <p:transition spd="med">
-        <p:fade/>
-      </p:transition>
-    </mc:Fallback>
-  </mc:AlternateContent>
-</p:sld>
-</file>
-
-<file path=ppt/slides/slide25.xml><?xml version="1.0" encoding="utf-8"?>
-<p:sld xmlns:a="http://schemas.openxmlformats.org/drawingml/2006/main" xmlns:r="http://schemas.openxmlformats.org/officeDocument/2006/relationships" xmlns:p="http://schemas.openxmlformats.org/presentationml/2006/main">
-  <p:cSld>
-    <p:spTree>
-      <p:nvGrpSpPr>
-        <p:cNvPr id="1" name=""/>
-        <p:cNvGrpSpPr/>
-        <p:nvPr/>
-      </p:nvGrpSpPr>
-      <p:grpSpPr>
-        <a:xfrm>
-          <a:off x="0" y="0"/>
-          <a:ext cx="0" cy="0"/>
-          <a:chOff x="0" y="0"/>
-          <a:chExt cx="0" cy="0"/>
-        </a:xfrm>
-      </p:grpSpPr>
-      <p:sp>
-        <p:nvSpPr>
-          <p:cNvPr id="4" name="Title 3">
-            <a:extLst>
-              <a:ext uri="{FF2B5EF4-FFF2-40B4-BE49-F238E27FC236}">
-                <a16:creationId xmlns:a16="http://schemas.microsoft.com/office/drawing/2014/main" id="{E9928119-558D-47F3-9F44-B2C33419FD3C}"/>
-              </a:ext>
-            </a:extLst>
-          </p:cNvPr>
-          <p:cNvSpPr>
-            <a:spLocks noGrp="1"/>
-          </p:cNvSpPr>
-          <p:nvPr>
-            <p:ph type="title"/>
-          </p:nvPr>
-        </p:nvSpPr>
-        <p:spPr/>
-        <p:txBody>
-          <a:bodyPr/>
-          <a:lstStyle/>
-          <a:p>
-            <a:endParaRPr lang="en-US"/>
-          </a:p>
-        </p:txBody>
-      </p:sp>
-    </p:spTree>
-    <p:extLst>
-      <p:ext uri="{BB962C8B-B14F-4D97-AF65-F5344CB8AC3E}">
-        <p14:creationId xmlns:p14="http://schemas.microsoft.com/office/powerpoint/2010/main" val="969265018"/>
       </p:ext>
     </p:extLst>
   </p:cSld>
@@ -13976,6 +14809,73 @@
           <a:chExt cx="0" cy="0"/>
         </a:xfrm>
       </p:grpSpPr>
+      <p:sp>
+        <p:nvSpPr>
+          <p:cNvPr id="4" name="Title 3">
+            <a:extLst>
+              <a:ext uri="{FF2B5EF4-FFF2-40B4-BE49-F238E27FC236}">
+                <a16:creationId xmlns:a16="http://schemas.microsoft.com/office/drawing/2014/main" id="{E9928119-558D-47F3-9F44-B2C33419FD3C}"/>
+              </a:ext>
+            </a:extLst>
+          </p:cNvPr>
+          <p:cNvSpPr>
+            <a:spLocks noGrp="1"/>
+          </p:cNvSpPr>
+          <p:nvPr>
+            <p:ph type="title"/>
+          </p:nvPr>
+        </p:nvSpPr>
+        <p:spPr/>
+        <p:txBody>
+          <a:bodyPr/>
+          <a:lstStyle/>
+          <a:p>
+            <a:endParaRPr lang="en-US"/>
+          </a:p>
+        </p:txBody>
+      </p:sp>
+    </p:spTree>
+    <p:extLst>
+      <p:ext uri="{BB962C8B-B14F-4D97-AF65-F5344CB8AC3E}">
+        <p14:creationId xmlns:p14="http://schemas.microsoft.com/office/powerpoint/2010/main" val="969265018"/>
+      </p:ext>
+    </p:extLst>
+  </p:cSld>
+  <p:clrMapOvr>
+    <a:masterClrMapping/>
+  </p:clrMapOvr>
+  <mc:AlternateContent xmlns:mc="http://schemas.openxmlformats.org/markup-compatibility/2006" xmlns:p14="http://schemas.microsoft.com/office/powerpoint/2010/main">
+    <mc:Choice Requires="p14">
+      <p:transition spd="med" p14:dur="700">
+        <p:fade/>
+      </p:transition>
+    </mc:Choice>
+    <mc:Fallback xmlns="">
+      <p:transition spd="med">
+        <p:fade/>
+      </p:transition>
+    </mc:Fallback>
+  </mc:AlternateContent>
+</p:sld>
+</file>
+
+<file path=ppt/slides/slide27.xml><?xml version="1.0" encoding="utf-8"?>
+<p:sld xmlns:a="http://schemas.openxmlformats.org/drawingml/2006/main" xmlns:r="http://schemas.openxmlformats.org/officeDocument/2006/relationships" xmlns:p="http://schemas.openxmlformats.org/presentationml/2006/main">
+  <p:cSld>
+    <p:spTree>
+      <p:nvGrpSpPr>
+        <p:cNvPr id="1" name=""/>
+        <p:cNvGrpSpPr/>
+        <p:nvPr/>
+      </p:nvGrpSpPr>
+      <p:grpSpPr>
+        <a:xfrm>
+          <a:off x="0" y="0"/>
+          <a:ext cx="0" cy="0"/>
+          <a:chOff x="0" y="0"/>
+          <a:chExt cx="0" cy="0"/>
+        </a:xfrm>
+      </p:grpSpPr>
       <p:pic>
         <p:nvPicPr>
           <p:cNvPr id="1026" name="Picture 2" descr="Convolution_schematic">
@@ -14104,7 +15004,7 @@
 </p:sld>
 </file>
 
-<file path=ppt/slides/slide27.xml><?xml version="1.0" encoding="utf-8"?>
+<file path=ppt/slides/slide28.xml><?xml version="1.0" encoding="utf-8"?>
 <p:sld xmlns:a="http://schemas.openxmlformats.org/drawingml/2006/main" xmlns:r="http://schemas.openxmlformats.org/officeDocument/2006/relationships" xmlns:p="http://schemas.openxmlformats.org/presentationml/2006/main">
   <p:cSld>
     <p:spTree>
@@ -14287,7 +15187,7 @@
 </p:sld>
 </file>
 
-<file path=ppt/slides/slide28.xml><?xml version="1.0" encoding="utf-8"?>
+<file path=ppt/slides/slide29.xml><?xml version="1.0" encoding="utf-8"?>
 <p:sld xmlns:a="http://schemas.openxmlformats.org/drawingml/2006/main" xmlns:r="http://schemas.openxmlformats.org/officeDocument/2006/relationships" xmlns:p="http://schemas.openxmlformats.org/presentationml/2006/main">
   <p:cSld>
     <p:spTree>
@@ -14489,149 +15389,38 @@
       </p:grpSpPr>
       <p:pic>
         <p:nvPicPr>
-          <p:cNvPr id="1026" name="Picture 2" descr="F16001">
-            <a:extLst>
-              <a:ext uri="{FF2B5EF4-FFF2-40B4-BE49-F238E27FC236}">
-                <a16:creationId xmlns:a16="http://schemas.microsoft.com/office/drawing/2014/main" id="{C7B22DE8-D319-44D5-970A-A930A4BA4E01}"/>
+          <p:cNvPr id="3" name="Picture 2">
+            <a:extLst>
+              <a:ext uri="{FF2B5EF4-FFF2-40B4-BE49-F238E27FC236}">
+                <a16:creationId xmlns:a16="http://schemas.microsoft.com/office/drawing/2014/main" id="{DEFE0AA7-599F-47D5-8772-72921880F8E6}"/>
               </a:ext>
             </a:extLst>
           </p:cNvPr>
           <p:cNvPicPr>
-            <a:picLocks noChangeAspect="1" noChangeArrowheads="1"/>
+            <a:picLocks noChangeAspect="1"/>
           </p:cNvPicPr>
           <p:nvPr/>
         </p:nvPicPr>
         <p:blipFill>
-          <a:blip r:embed="rId3">
-            <a:extLst>
-              <a:ext uri="{28A0092B-C50C-407E-A947-70E740481C1C}">
-                <a14:useLocalDpi xmlns:a14="http://schemas.microsoft.com/office/drawing/2010/main" val="0"/>
-              </a:ext>
-            </a:extLst>
-          </a:blip>
-          <a:srcRect/>
+          <a:blip r:embed="rId3"/>
           <a:stretch>
             <a:fillRect/>
           </a:stretch>
         </p:blipFill>
-        <p:spPr bwMode="auto">
+        <p:spPr>
           <a:xfrm>
-            <a:off x="2045363" y="2355056"/>
-            <a:ext cx="8101273" cy="2147888"/>
+            <a:off x="1581150" y="1395412"/>
+            <a:ext cx="9029700" cy="4067175"/>
           </a:xfrm>
           <a:prstGeom prst="rect">
             <a:avLst/>
           </a:prstGeom>
-          <a:noFill/>
-          <a:extLst>
-            <a:ext uri="{909E8E84-426E-40DD-AFC4-6F175D3DCCD1}">
-              <a14:hiddenFill xmlns:a14="http://schemas.microsoft.com/office/drawing/2010/main">
-                <a:solidFill>
-                  <a:srgbClr val="FFFFFF"/>
-                </a:solidFill>
-              </a14:hiddenFill>
-            </a:ext>
-          </a:extLst>
         </p:spPr>
       </p:pic>
-      <p:sp>
-        <p:nvSpPr>
-          <p:cNvPr id="3" name="TextBox 2">
-            <a:extLst>
-              <a:ext uri="{FF2B5EF4-FFF2-40B4-BE49-F238E27FC236}">
-                <a16:creationId xmlns:a16="http://schemas.microsoft.com/office/drawing/2014/main" id="{88D27826-ABA4-41B4-9A9B-109678211BA8}"/>
-              </a:ext>
-            </a:extLst>
-          </p:cNvPr>
-          <p:cNvSpPr txBox="1"/>
-          <p:nvPr/>
-        </p:nvSpPr>
-        <p:spPr>
-          <a:xfrm>
-            <a:off x="0" y="6550223"/>
-            <a:ext cx="12192000" cy="307777"/>
-          </a:xfrm>
-          <a:prstGeom prst="rect">
-            <a:avLst/>
-          </a:prstGeom>
-          <a:noFill/>
-        </p:spPr>
-        <p:txBody>
-          <a:bodyPr wrap="square" rtlCol="0">
-            <a:spAutoFit/>
-          </a:bodyPr>
-          <a:lstStyle/>
-          <a:p>
-            <a:r>
-              <a:rPr lang="en-US" sz="1400" dirty="0">
-                <a:solidFill>
-                  <a:schemeClr val="tx1">
-                    <a:lumMod val="65000"/>
-                    <a:lumOff val="35000"/>
-                  </a:schemeClr>
-                </a:solidFill>
-                <a:latin typeface="+mj-lt"/>
-                <a:ea typeface="Verdana" panose="020B0604030504040204" pitchFamily="34" charset="0"/>
-              </a:rPr>
-              <a:t>Source: Glassner, A. (2021). </a:t>
-            </a:r>
-            <a:r>
-              <a:rPr lang="en-US" sz="1400" i="1" dirty="0">
-                <a:solidFill>
-                  <a:schemeClr val="tx1">
-                    <a:lumMod val="65000"/>
-                    <a:lumOff val="35000"/>
-                  </a:schemeClr>
-                </a:solidFill>
-                <a:latin typeface="+mj-lt"/>
-                <a:ea typeface="Verdana" panose="020B0604030504040204" pitchFamily="34" charset="0"/>
-              </a:rPr>
-              <a:t>Deep learning: A visual approach</a:t>
-            </a:r>
-            <a:r>
-              <a:rPr lang="en-US" sz="1400" dirty="0">
-                <a:solidFill>
-                  <a:schemeClr val="tx1">
-                    <a:lumMod val="65000"/>
-                    <a:lumOff val="35000"/>
-                  </a:schemeClr>
-                </a:solidFill>
-                <a:latin typeface="+mj-lt"/>
-                <a:ea typeface="Verdana" panose="020B0604030504040204" pitchFamily="34" charset="0"/>
-              </a:rPr>
-              <a:t>. </a:t>
-            </a:r>
-            <a:r>
-              <a:rPr lang="en-US" sz="1400" b="0" i="0" dirty="0">
-                <a:solidFill>
-                  <a:schemeClr val="tx1">
-                    <a:lumMod val="65000"/>
-                    <a:lumOff val="35000"/>
-                  </a:schemeClr>
-                </a:solidFill>
-                <a:effectLst/>
-                <a:latin typeface="+mj-lt"/>
-                <a:ea typeface="Verdana" panose="020B0604030504040204" pitchFamily="34" charset="0"/>
-              </a:rPr>
-              <a:t>San Francisco, CA: No Starch Press. (Chapter 16)</a:t>
-            </a:r>
-            <a:endParaRPr lang="en-US" sz="1400" dirty="0">
-              <a:solidFill>
-                <a:schemeClr val="tx1">
-                  <a:lumMod val="65000"/>
-                  <a:lumOff val="35000"/>
-                </a:schemeClr>
-              </a:solidFill>
-              <a:latin typeface="+mj-lt"/>
-              <a:ea typeface="Verdana" panose="020B0604030504040204" pitchFamily="34" charset="0"/>
-            </a:endParaRPr>
-          </a:p>
-        </p:txBody>
-      </p:sp>
     </p:spTree>
     <p:extLst>
       <p:ext uri="{BB962C8B-B14F-4D97-AF65-F5344CB8AC3E}">
-        <p14:creationId xmlns:p14="http://schemas.microsoft.com/office/powerpoint/2010/main" val="3174290277"/>
+        <p14:creationId xmlns:p14="http://schemas.microsoft.com/office/powerpoint/2010/main" val="1777948658"/>
       </p:ext>
     </p:extLst>
   </p:cSld>
@@ -14672,10 +15461,10 @@
       </p:grpSpPr>
       <p:pic>
         <p:nvPicPr>
-          <p:cNvPr id="2050" name="Picture 2" descr="F16002">
-            <a:extLst>
-              <a:ext uri="{FF2B5EF4-FFF2-40B4-BE49-F238E27FC236}">
-                <a16:creationId xmlns:a16="http://schemas.microsoft.com/office/drawing/2014/main" id="{7D6EE558-83B9-4802-AC40-8B64E21168D6}"/>
+          <p:cNvPr id="1026" name="Picture 2" descr="F16001">
+            <a:extLst>
+              <a:ext uri="{FF2B5EF4-FFF2-40B4-BE49-F238E27FC236}">
+                <a16:creationId xmlns:a16="http://schemas.microsoft.com/office/drawing/2014/main" id="{C7B22DE8-D319-44D5-970A-A930A4BA4E01}"/>
               </a:ext>
             </a:extLst>
           </p:cNvPr>
@@ -14699,8 +15488,8 @@
         </p:blipFill>
         <p:spPr bwMode="auto">
           <a:xfrm>
-            <a:off x="2790825" y="804863"/>
-            <a:ext cx="6610350" cy="5248275"/>
+            <a:off x="2045363" y="2355056"/>
+            <a:ext cx="8101273" cy="2147888"/>
           </a:xfrm>
           <a:prstGeom prst="rect">
             <a:avLst/>
@@ -14719,10 +15508,10 @@
       </p:pic>
       <p:sp>
         <p:nvSpPr>
-          <p:cNvPr id="4" name="TextBox 3">
-            <a:extLst>
-              <a:ext uri="{FF2B5EF4-FFF2-40B4-BE49-F238E27FC236}">
-                <a16:creationId xmlns:a16="http://schemas.microsoft.com/office/drawing/2014/main" id="{11D1FE89-FDFB-428E-87CE-C3D41E98741D}"/>
+          <p:cNvPr id="3" name="TextBox 2">
+            <a:extLst>
+              <a:ext uri="{FF2B5EF4-FFF2-40B4-BE49-F238E27FC236}">
+                <a16:creationId xmlns:a16="http://schemas.microsoft.com/office/drawing/2014/main" id="{88D27826-ABA4-41B4-9A9B-109678211BA8}"/>
               </a:ext>
             </a:extLst>
           </p:cNvPr>
@@ -14814,7 +15603,7 @@
     </p:spTree>
     <p:extLst>
       <p:ext uri="{BB962C8B-B14F-4D97-AF65-F5344CB8AC3E}">
-        <p14:creationId xmlns:p14="http://schemas.microsoft.com/office/powerpoint/2010/main" val="1800929916"/>
+        <p14:creationId xmlns:p14="http://schemas.microsoft.com/office/powerpoint/2010/main" val="3174290277"/>
       </p:ext>
     </p:extLst>
   </p:cSld>
@@ -14855,10 +15644,10 @@
       </p:grpSpPr>
       <p:pic>
         <p:nvPicPr>
-          <p:cNvPr id="2052" name="Picture 4" descr="F16003">
-            <a:extLst>
-              <a:ext uri="{FF2B5EF4-FFF2-40B4-BE49-F238E27FC236}">
-                <a16:creationId xmlns:a16="http://schemas.microsoft.com/office/drawing/2014/main" id="{3B1B0F19-5AFE-490F-BF03-39FF85C15B46}"/>
+          <p:cNvPr id="2050" name="Picture 2" descr="F16002">
+            <a:extLst>
+              <a:ext uri="{FF2B5EF4-FFF2-40B4-BE49-F238E27FC236}">
+                <a16:creationId xmlns:a16="http://schemas.microsoft.com/office/drawing/2014/main" id="{7D6EE558-83B9-4802-AC40-8B64E21168D6}"/>
               </a:ext>
             </a:extLst>
           </p:cNvPr>
@@ -14882,8 +15671,8 @@
         </p:blipFill>
         <p:spPr bwMode="auto">
           <a:xfrm>
-            <a:off x="2795587" y="671512"/>
-            <a:ext cx="6600825" cy="5514975"/>
+            <a:off x="2790825" y="804863"/>
+            <a:ext cx="6610350" cy="5248275"/>
           </a:xfrm>
           <a:prstGeom prst="rect">
             <a:avLst/>
@@ -14905,7 +15694,7 @@
           <p:cNvPr id="4" name="TextBox 3">
             <a:extLst>
               <a:ext uri="{FF2B5EF4-FFF2-40B4-BE49-F238E27FC236}">
-                <a16:creationId xmlns:a16="http://schemas.microsoft.com/office/drawing/2014/main" id="{400A9EAF-887F-46C8-8192-4AFEF6ABBFD4}"/>
+                <a16:creationId xmlns:a16="http://schemas.microsoft.com/office/drawing/2014/main" id="{11D1FE89-FDFB-428E-87CE-C3D41E98741D}"/>
               </a:ext>
             </a:extLst>
           </p:cNvPr>
@@ -14997,7 +15786,7 @@
     </p:spTree>
     <p:extLst>
       <p:ext uri="{BB962C8B-B14F-4D97-AF65-F5344CB8AC3E}">
-        <p14:creationId xmlns:p14="http://schemas.microsoft.com/office/powerpoint/2010/main" val="4263767127"/>
+        <p14:creationId xmlns:p14="http://schemas.microsoft.com/office/powerpoint/2010/main" val="1800929916"/>
       </p:ext>
     </p:extLst>
   </p:cSld>
@@ -15038,10 +15827,10 @@
       </p:grpSpPr>
       <p:pic>
         <p:nvPicPr>
-          <p:cNvPr id="3074" name="Picture 2" descr="F16004">
-            <a:extLst>
-              <a:ext uri="{FF2B5EF4-FFF2-40B4-BE49-F238E27FC236}">
-                <a16:creationId xmlns:a16="http://schemas.microsoft.com/office/drawing/2014/main" id="{BE352915-61B8-4F43-B389-E1DB0AFE6829}"/>
+          <p:cNvPr id="2052" name="Picture 4" descr="F16003">
+            <a:extLst>
+              <a:ext uri="{FF2B5EF4-FFF2-40B4-BE49-F238E27FC236}">
+                <a16:creationId xmlns:a16="http://schemas.microsoft.com/office/drawing/2014/main" id="{3B1B0F19-5AFE-490F-BF03-39FF85C15B46}"/>
               </a:ext>
             </a:extLst>
           </p:cNvPr>
@@ -15065,8 +15854,8 @@
         </p:blipFill>
         <p:spPr bwMode="auto">
           <a:xfrm>
-            <a:off x="2814638" y="1671638"/>
-            <a:ext cx="6562725" cy="3514725"/>
+            <a:off x="2795587" y="671512"/>
+            <a:ext cx="6600825" cy="5514975"/>
           </a:xfrm>
           <a:prstGeom prst="rect">
             <a:avLst/>
@@ -15085,10 +15874,10 @@
       </p:pic>
       <p:sp>
         <p:nvSpPr>
-          <p:cNvPr id="3" name="TextBox 2">
-            <a:extLst>
-              <a:ext uri="{FF2B5EF4-FFF2-40B4-BE49-F238E27FC236}">
-                <a16:creationId xmlns:a16="http://schemas.microsoft.com/office/drawing/2014/main" id="{B2E1B2B1-323E-42BA-A8AD-1EB02B490DEF}"/>
+          <p:cNvPr id="4" name="TextBox 3">
+            <a:extLst>
+              <a:ext uri="{FF2B5EF4-FFF2-40B4-BE49-F238E27FC236}">
+                <a16:creationId xmlns:a16="http://schemas.microsoft.com/office/drawing/2014/main" id="{400A9EAF-887F-46C8-8192-4AFEF6ABBFD4}"/>
               </a:ext>
             </a:extLst>
           </p:cNvPr>
@@ -15180,7 +15969,7 @@
     </p:spTree>
     <p:extLst>
       <p:ext uri="{BB962C8B-B14F-4D97-AF65-F5344CB8AC3E}">
-        <p14:creationId xmlns:p14="http://schemas.microsoft.com/office/powerpoint/2010/main" val="2551641966"/>
+        <p14:creationId xmlns:p14="http://schemas.microsoft.com/office/powerpoint/2010/main" val="4263767127"/>
       </p:ext>
     </p:extLst>
   </p:cSld>
@@ -15221,6 +16010,189 @@
       </p:grpSpPr>
       <p:pic>
         <p:nvPicPr>
+          <p:cNvPr id="3074" name="Picture 2" descr="F16004">
+            <a:extLst>
+              <a:ext uri="{FF2B5EF4-FFF2-40B4-BE49-F238E27FC236}">
+                <a16:creationId xmlns:a16="http://schemas.microsoft.com/office/drawing/2014/main" id="{BE352915-61B8-4F43-B389-E1DB0AFE6829}"/>
+              </a:ext>
+            </a:extLst>
+          </p:cNvPr>
+          <p:cNvPicPr>
+            <a:picLocks noChangeAspect="1" noChangeArrowheads="1"/>
+          </p:cNvPicPr>
+          <p:nvPr/>
+        </p:nvPicPr>
+        <p:blipFill>
+          <a:blip r:embed="rId3">
+            <a:extLst>
+              <a:ext uri="{28A0092B-C50C-407E-A947-70E740481C1C}">
+                <a14:useLocalDpi xmlns:a14="http://schemas.microsoft.com/office/drawing/2010/main" val="0"/>
+              </a:ext>
+            </a:extLst>
+          </a:blip>
+          <a:srcRect/>
+          <a:stretch>
+            <a:fillRect/>
+          </a:stretch>
+        </p:blipFill>
+        <p:spPr bwMode="auto">
+          <a:xfrm>
+            <a:off x="2814638" y="1671638"/>
+            <a:ext cx="6562725" cy="3514725"/>
+          </a:xfrm>
+          <a:prstGeom prst="rect">
+            <a:avLst/>
+          </a:prstGeom>
+          <a:noFill/>
+          <a:extLst>
+            <a:ext uri="{909E8E84-426E-40DD-AFC4-6F175D3DCCD1}">
+              <a14:hiddenFill xmlns:a14="http://schemas.microsoft.com/office/drawing/2010/main">
+                <a:solidFill>
+                  <a:srgbClr val="FFFFFF"/>
+                </a:solidFill>
+              </a14:hiddenFill>
+            </a:ext>
+          </a:extLst>
+        </p:spPr>
+      </p:pic>
+      <p:sp>
+        <p:nvSpPr>
+          <p:cNvPr id="3" name="TextBox 2">
+            <a:extLst>
+              <a:ext uri="{FF2B5EF4-FFF2-40B4-BE49-F238E27FC236}">
+                <a16:creationId xmlns:a16="http://schemas.microsoft.com/office/drawing/2014/main" id="{B2E1B2B1-323E-42BA-A8AD-1EB02B490DEF}"/>
+              </a:ext>
+            </a:extLst>
+          </p:cNvPr>
+          <p:cNvSpPr txBox="1"/>
+          <p:nvPr/>
+        </p:nvSpPr>
+        <p:spPr>
+          <a:xfrm>
+            <a:off x="0" y="6550223"/>
+            <a:ext cx="12192000" cy="307777"/>
+          </a:xfrm>
+          <a:prstGeom prst="rect">
+            <a:avLst/>
+          </a:prstGeom>
+          <a:noFill/>
+        </p:spPr>
+        <p:txBody>
+          <a:bodyPr wrap="square" rtlCol="0">
+            <a:spAutoFit/>
+          </a:bodyPr>
+          <a:lstStyle/>
+          <a:p>
+            <a:r>
+              <a:rPr lang="en-US" sz="1400" dirty="0">
+                <a:solidFill>
+                  <a:schemeClr val="tx1">
+                    <a:lumMod val="65000"/>
+                    <a:lumOff val="35000"/>
+                  </a:schemeClr>
+                </a:solidFill>
+                <a:latin typeface="+mj-lt"/>
+                <a:ea typeface="Verdana" panose="020B0604030504040204" pitchFamily="34" charset="0"/>
+              </a:rPr>
+              <a:t>Source: Glassner, A. (2021). </a:t>
+            </a:r>
+            <a:r>
+              <a:rPr lang="en-US" sz="1400" i="1" dirty="0">
+                <a:solidFill>
+                  <a:schemeClr val="tx1">
+                    <a:lumMod val="65000"/>
+                    <a:lumOff val="35000"/>
+                  </a:schemeClr>
+                </a:solidFill>
+                <a:latin typeface="+mj-lt"/>
+                <a:ea typeface="Verdana" panose="020B0604030504040204" pitchFamily="34" charset="0"/>
+              </a:rPr>
+              <a:t>Deep learning: A visual approach</a:t>
+            </a:r>
+            <a:r>
+              <a:rPr lang="en-US" sz="1400" dirty="0">
+                <a:solidFill>
+                  <a:schemeClr val="tx1">
+                    <a:lumMod val="65000"/>
+                    <a:lumOff val="35000"/>
+                  </a:schemeClr>
+                </a:solidFill>
+                <a:latin typeface="+mj-lt"/>
+                <a:ea typeface="Verdana" panose="020B0604030504040204" pitchFamily="34" charset="0"/>
+              </a:rPr>
+              <a:t>. </a:t>
+            </a:r>
+            <a:r>
+              <a:rPr lang="en-US" sz="1400" b="0" i="0" dirty="0">
+                <a:solidFill>
+                  <a:schemeClr val="tx1">
+                    <a:lumMod val="65000"/>
+                    <a:lumOff val="35000"/>
+                  </a:schemeClr>
+                </a:solidFill>
+                <a:effectLst/>
+                <a:latin typeface="+mj-lt"/>
+                <a:ea typeface="Verdana" panose="020B0604030504040204" pitchFamily="34" charset="0"/>
+              </a:rPr>
+              <a:t>San Francisco, CA: No Starch Press. (Chapter 16)</a:t>
+            </a:r>
+            <a:endParaRPr lang="en-US" sz="1400" dirty="0">
+              <a:solidFill>
+                <a:schemeClr val="tx1">
+                  <a:lumMod val="65000"/>
+                  <a:lumOff val="35000"/>
+                </a:schemeClr>
+              </a:solidFill>
+              <a:latin typeface="+mj-lt"/>
+              <a:ea typeface="Verdana" panose="020B0604030504040204" pitchFamily="34" charset="0"/>
+            </a:endParaRPr>
+          </a:p>
+        </p:txBody>
+      </p:sp>
+    </p:spTree>
+    <p:extLst>
+      <p:ext uri="{BB962C8B-B14F-4D97-AF65-F5344CB8AC3E}">
+        <p14:creationId xmlns:p14="http://schemas.microsoft.com/office/powerpoint/2010/main" val="2551641966"/>
+      </p:ext>
+    </p:extLst>
+  </p:cSld>
+  <p:clrMapOvr>
+    <a:masterClrMapping/>
+  </p:clrMapOvr>
+  <mc:AlternateContent xmlns:mc="http://schemas.openxmlformats.org/markup-compatibility/2006" xmlns:p14="http://schemas.microsoft.com/office/powerpoint/2010/main">
+    <mc:Choice Requires="p14">
+      <p:transition spd="med" p14:dur="700">
+        <p:fade/>
+      </p:transition>
+    </mc:Choice>
+    <mc:Fallback xmlns="">
+      <p:transition spd="med">
+        <p:fade/>
+      </p:transition>
+    </mc:Fallback>
+  </mc:AlternateContent>
+</p:sld>
+</file>
+
+<file path=ppt/slides/slide8.xml><?xml version="1.0" encoding="utf-8"?>
+<p:sld xmlns:a="http://schemas.openxmlformats.org/drawingml/2006/main" xmlns:r="http://schemas.openxmlformats.org/officeDocument/2006/relationships" xmlns:p="http://schemas.openxmlformats.org/presentationml/2006/main">
+  <p:cSld>
+    <p:spTree>
+      <p:nvGrpSpPr>
+        <p:cNvPr id="1" name=""/>
+        <p:cNvGrpSpPr/>
+        <p:nvPr/>
+      </p:nvGrpSpPr>
+      <p:grpSpPr>
+        <a:xfrm>
+          <a:off x="0" y="0"/>
+          <a:ext cx="0" cy="0"/>
+          <a:chOff x="0" y="0"/>
+          <a:chExt cx="0" cy="0"/>
+        </a:xfrm>
+      </p:grpSpPr>
+      <p:pic>
+        <p:nvPicPr>
           <p:cNvPr id="5122" name="Picture 2" descr="F16005">
             <a:extLst>
               <a:ext uri="{FF2B5EF4-FFF2-40B4-BE49-F238E27FC236}">
@@ -15385,7 +16357,7 @@
 </p:sld>
 </file>
 
-<file path=ppt/slides/slide8.xml><?xml version="1.0" encoding="utf-8"?>
+<file path=ppt/slides/slide9.xml><?xml version="1.0" encoding="utf-8"?>
 <p:sld xmlns:a="http://schemas.openxmlformats.org/drawingml/2006/main" xmlns:r="http://schemas.openxmlformats.org/officeDocument/2006/relationships" xmlns:p="http://schemas.openxmlformats.org/presentationml/2006/main">
   <p:cSld>
     <p:spTree>
@@ -15864,189 +16836,6 @@
       <p:bldP spid="6" grpId="0"/>
     </p:bldLst>
   </p:timing>
-</p:sld>
-</file>
-
-<file path=ppt/slides/slide9.xml><?xml version="1.0" encoding="utf-8"?>
-<p:sld xmlns:a="http://schemas.openxmlformats.org/drawingml/2006/main" xmlns:r="http://schemas.openxmlformats.org/officeDocument/2006/relationships" xmlns:p="http://schemas.openxmlformats.org/presentationml/2006/main">
-  <p:cSld>
-    <p:spTree>
-      <p:nvGrpSpPr>
-        <p:cNvPr id="1" name=""/>
-        <p:cNvGrpSpPr/>
-        <p:nvPr/>
-      </p:nvGrpSpPr>
-      <p:grpSpPr>
-        <a:xfrm>
-          <a:off x="0" y="0"/>
-          <a:ext cx="0" cy="0"/>
-          <a:chOff x="0" y="0"/>
-          <a:chExt cx="0" cy="0"/>
-        </a:xfrm>
-      </p:grpSpPr>
-      <p:sp>
-        <p:nvSpPr>
-          <p:cNvPr id="4" name="TextBox 3">
-            <a:extLst>
-              <a:ext uri="{FF2B5EF4-FFF2-40B4-BE49-F238E27FC236}">
-                <a16:creationId xmlns:a16="http://schemas.microsoft.com/office/drawing/2014/main" id="{749C7923-C536-48CC-8E45-5459E73CC683}"/>
-              </a:ext>
-            </a:extLst>
-          </p:cNvPr>
-          <p:cNvSpPr txBox="1"/>
-          <p:nvPr/>
-        </p:nvSpPr>
-        <p:spPr>
-          <a:xfrm>
-            <a:off x="0" y="6550223"/>
-            <a:ext cx="12192000" cy="307777"/>
-          </a:xfrm>
-          <a:prstGeom prst="rect">
-            <a:avLst/>
-          </a:prstGeom>
-          <a:noFill/>
-        </p:spPr>
-        <p:txBody>
-          <a:bodyPr wrap="square" rtlCol="0">
-            <a:spAutoFit/>
-          </a:bodyPr>
-          <a:lstStyle/>
-          <a:p>
-            <a:r>
-              <a:rPr lang="en-US" sz="1400" dirty="0">
-                <a:solidFill>
-                  <a:schemeClr val="tx1">
-                    <a:lumMod val="65000"/>
-                    <a:lumOff val="35000"/>
-                  </a:schemeClr>
-                </a:solidFill>
-                <a:latin typeface="+mj-lt"/>
-                <a:ea typeface="Verdana" panose="020B0604030504040204" pitchFamily="34" charset="0"/>
-              </a:rPr>
-              <a:t>Source: Glassner, A. (2021). </a:t>
-            </a:r>
-            <a:r>
-              <a:rPr lang="en-US" sz="1400" i="1" dirty="0">
-                <a:solidFill>
-                  <a:schemeClr val="tx1">
-                    <a:lumMod val="65000"/>
-                    <a:lumOff val="35000"/>
-                  </a:schemeClr>
-                </a:solidFill>
-                <a:latin typeface="+mj-lt"/>
-                <a:ea typeface="Verdana" panose="020B0604030504040204" pitchFamily="34" charset="0"/>
-              </a:rPr>
-              <a:t>Deep learning: A visual approach</a:t>
-            </a:r>
-            <a:r>
-              <a:rPr lang="en-US" sz="1400" dirty="0">
-                <a:solidFill>
-                  <a:schemeClr val="tx1">
-                    <a:lumMod val="65000"/>
-                    <a:lumOff val="35000"/>
-                  </a:schemeClr>
-                </a:solidFill>
-                <a:latin typeface="+mj-lt"/>
-                <a:ea typeface="Verdana" panose="020B0604030504040204" pitchFamily="34" charset="0"/>
-              </a:rPr>
-              <a:t>. </a:t>
-            </a:r>
-            <a:r>
-              <a:rPr lang="en-US" sz="1400" b="0" i="0" dirty="0">
-                <a:solidFill>
-                  <a:schemeClr val="tx1">
-                    <a:lumMod val="65000"/>
-                    <a:lumOff val="35000"/>
-                  </a:schemeClr>
-                </a:solidFill>
-                <a:effectLst/>
-                <a:latin typeface="+mj-lt"/>
-                <a:ea typeface="Verdana" panose="020B0604030504040204" pitchFamily="34" charset="0"/>
-              </a:rPr>
-              <a:t>San Francisco, CA: No Starch Press. (Chapter 16)</a:t>
-            </a:r>
-            <a:endParaRPr lang="en-US" sz="1400" dirty="0">
-              <a:solidFill>
-                <a:schemeClr val="tx1">
-                  <a:lumMod val="65000"/>
-                  <a:lumOff val="35000"/>
-                </a:schemeClr>
-              </a:solidFill>
-              <a:latin typeface="+mj-lt"/>
-              <a:ea typeface="Verdana" panose="020B0604030504040204" pitchFamily="34" charset="0"/>
-            </a:endParaRPr>
-          </a:p>
-        </p:txBody>
-      </p:sp>
-      <p:pic>
-        <p:nvPicPr>
-          <p:cNvPr id="8194" name="Picture 2" descr="F16009">
-            <a:extLst>
-              <a:ext uri="{FF2B5EF4-FFF2-40B4-BE49-F238E27FC236}">
-                <a16:creationId xmlns:a16="http://schemas.microsoft.com/office/drawing/2014/main" id="{1DC4E2DC-5327-427C-AB88-2BF6CA228D3F}"/>
-              </a:ext>
-            </a:extLst>
-          </p:cNvPr>
-          <p:cNvPicPr>
-            <a:picLocks noChangeAspect="1" noChangeArrowheads="1"/>
-          </p:cNvPicPr>
-          <p:nvPr/>
-        </p:nvPicPr>
-        <p:blipFill>
-          <a:blip r:embed="rId3">
-            <a:extLst>
-              <a:ext uri="{28A0092B-C50C-407E-A947-70E740481C1C}">
-                <a14:useLocalDpi xmlns:a14="http://schemas.microsoft.com/office/drawing/2010/main" val="0"/>
-              </a:ext>
-            </a:extLst>
-          </a:blip>
-          <a:srcRect/>
-          <a:stretch>
-            <a:fillRect/>
-          </a:stretch>
-        </p:blipFill>
-        <p:spPr bwMode="auto">
-          <a:xfrm>
-            <a:off x="3971925" y="2014538"/>
-            <a:ext cx="4248150" cy="2828925"/>
-          </a:xfrm>
-          <a:prstGeom prst="rect">
-            <a:avLst/>
-          </a:prstGeom>
-          <a:noFill/>
-          <a:extLst>
-            <a:ext uri="{909E8E84-426E-40DD-AFC4-6F175D3DCCD1}">
-              <a14:hiddenFill xmlns:a14="http://schemas.microsoft.com/office/drawing/2010/main">
-                <a:solidFill>
-                  <a:srgbClr val="FFFFFF"/>
-                </a:solidFill>
-              </a14:hiddenFill>
-            </a:ext>
-          </a:extLst>
-        </p:spPr>
-      </p:pic>
-    </p:spTree>
-    <p:extLst>
-      <p:ext uri="{BB962C8B-B14F-4D97-AF65-F5344CB8AC3E}">
-        <p14:creationId xmlns:p14="http://schemas.microsoft.com/office/powerpoint/2010/main" val="970965800"/>
-      </p:ext>
-    </p:extLst>
-  </p:cSld>
-  <p:clrMapOvr>
-    <a:masterClrMapping/>
-  </p:clrMapOvr>
-  <mc:AlternateContent xmlns:mc="http://schemas.openxmlformats.org/markup-compatibility/2006" xmlns:p14="http://schemas.microsoft.com/office/powerpoint/2010/main">
-    <mc:Choice Requires="p14">
-      <p:transition spd="med" p14:dur="700">
-        <p:fade/>
-      </p:transition>
-    </mc:Choice>
-    <mc:Fallback xmlns="">
-      <p:transition spd="med">
-        <p:fade/>
-      </p:transition>
-    </mc:Fallback>
-  </mc:AlternateContent>
 </p:sld>
 </file>
 

</xml_diff>

<commit_message>
Final updates for workshop (09.15.22).
</commit_message>
<xml_diff>
--- a/presentations/02_cnn_anatomy.pptx
+++ b/presentations/02_cnn_anatomy.pptx
@@ -31,8 +31,8 @@
     <p:sldId id="340" r:id="rId22"/>
     <p:sldId id="342" r:id="rId23"/>
     <p:sldId id="304" r:id="rId24"/>
-    <p:sldId id="346" r:id="rId25"/>
-    <p:sldId id="309" r:id="rId26"/>
+    <p:sldId id="309" r:id="rId25"/>
+    <p:sldId id="346" r:id="rId26"/>
     <p:sldId id="345" r:id="rId27"/>
     <p:sldId id="349" r:id="rId28"/>
     <p:sldId id="344" r:id="rId29"/>
@@ -236,7 +236,7 @@
           <a:p>
             <a:fld id="{FD93C9B2-20F6-4DB1-B471-224337D0AC79}" type="datetimeFigureOut">
               <a:rPr lang="en-US" smtClean="0"/>
-              <a:t>9/12/2022</a:t>
+              <a:t>9/15/2022</a:t>
             </a:fld>
             <a:endParaRPr lang="en-US"/>
           </a:p>
@@ -649,7 +649,7 @@
             </a:pPr>
             <a:r>
               <a:rPr lang="en-US" dirty="0"/>
-              <a:t>Center the 3 x 3 grid of weights over each pixel – apply neuron to create single output.</a:t>
+              <a:t>Center the 3 x 3 grid of weights over each pixel and apply the neuron to create a single output.</a:t>
             </a:r>
           </a:p>
           <a:p>
@@ -815,6 +815,15 @@
               <a:t>We then slide the filter / kernel over by 1 and repeat the process.  The result this time is a -4, as shown in the output tensor.  Keep in mind: the convolution operation sweeps the kernel from left to right, top to bottom.  And continues until it reaches the bottom right-hand corner.  There are variations we will discuss later. </a:t>
             </a:r>
           </a:p>
+          <a:p>
+            <a:pPr marL="234841" indent="-234841">
+              <a:buAutoNum type="arabicPeriod"/>
+            </a:pPr>
+            <a:r>
+              <a:rPr lang="en-US" dirty="0"/>
+              <a:t>Let’s simulate this process…</a:t>
+            </a:r>
+          </a:p>
         </p:txBody>
       </p:sp>
       <p:sp>
@@ -897,7 +906,19 @@
           <a:bodyPr/>
           <a:lstStyle/>
           <a:p>
+            <a:r>
+              <a:rPr lang="en-US" dirty="0"/>
+              <a:t>Here we see 3 kernels – one each for the red, green, and blue channels.  As the kernel moves across the underlying input, the two matrices are multiplied.  The results of that multiplication are summed, resulting in a single number for each channel.  And finally, these three numbers are added together end the result placed in the output matrix. </a:t>
+            </a:r>
+          </a:p>
+          <a:p>
             <a:endParaRPr lang="en-US" dirty="0"/>
+          </a:p>
+          <a:p>
+            <a:r>
+              <a:rPr lang="en-US" dirty="0"/>
+              <a:t>Around the edges, you see cells with values of zero.  We will talk about those shortly. </a:t>
+            </a:r>
           </a:p>
         </p:txBody>
       </p:sp>
@@ -1215,7 +1236,7 @@
                 <a:effectLst/>
                 <a:latin typeface="+mn-lt"/>
               </a:rPr>
-              <a:t>Need for padding – minor issue w/convolution operation.  When we apply a convolution to an image, the output tensor has smaller dimensions than the input.  Let’s simulate the process.  </a:t>
+              <a:t>There’s a minor issue w/convolution operation.  When we convolve an image, the output tensor has smaller dimensions than the input.  </a:t>
             </a:r>
           </a:p>
           <a:p>
@@ -1229,6 +1250,29 @@
             </a:endParaRPr>
           </a:p>
           <a:p>
+            <a:pPr algn="l"/>
+            <a:r>
+              <a:rPr lang="en-US" b="0" i="0" dirty="0">
+                <a:solidFill>
+                  <a:srgbClr val="6D737D"/>
+                </a:solidFill>
+                <a:effectLst/>
+                <a:latin typeface="+mn-lt"/>
+              </a:rPr>
+              <a:t>Let’s simulate the process.  </a:t>
+            </a:r>
+          </a:p>
+          <a:p>
+            <a:pPr algn="l"/>
+            <a:endParaRPr lang="en-US" b="0" i="0" dirty="0">
+              <a:solidFill>
+                <a:srgbClr val="6D737D"/>
+              </a:solidFill>
+              <a:effectLst/>
+              <a:latin typeface="+mn-lt"/>
+            </a:endParaRPr>
+          </a:p>
+          <a:p>
             <a:pPr marL="228600" indent="-228600" algn="l">
               <a:buAutoNum type="arabicPeriod"/>
             </a:pPr>
@@ -1270,7 +1314,7 @@
                 <a:effectLst/>
                 <a:latin typeface="+mn-lt"/>
               </a:rPr>
-              <a:t>The filter values are multiplied by the input values (the convolution is executed) and the output is inserted into the output tensor.</a:t>
+              <a:t>The filter values are multiplied by the input values (the convolution is executed) and the summed value is inserted into the output tensor.</a:t>
             </a:r>
           </a:p>
           <a:p>
@@ -1285,7 +1329,7 @@
                 <a:effectLst/>
                 <a:latin typeface="+mn-lt"/>
               </a:rPr>
-              <a:t>However, this leads to an output tensor smaller than the original input.  Let’s visualize this by laying the output tensor on top of the input tensor, using the upper-right corner as our anchor point.  Here the light grey footprint is smaller by 1 square on all sides.</a:t>
+              <a:t>However, this leads to an output tensor smaller than the original input.  Let’s visualize this by laying the output tensor on top of the input tensor, using the upper-left corner as our anchor point.  Here the light grey footprint is smaller by 1 square on all sides.</a:t>
             </a:r>
           </a:p>
           <a:p>
@@ -1467,7 +1511,23 @@
             <a:pPr algn="l"/>
             <a:r>
               <a:rPr lang="en-US" dirty="0"/>
-              <a:t>Padding allows us create an output image of the same width and height as the input. The idea is that we add a border of extra elements around the outside of the input.  All the elements have the same value. If we place zeros in all the new elements, we call the technique zero-padding. In practice, we almost always use zeros, so people often refer to zero-padding as merely padding, with the understanding that if they mean to use any value other than zero, they say so explicitly.</a:t>
+              <a:t>Padding allows us to create an output image of the same width and height as the input.  If we place zeros in these cells, it’s called </a:t>
+            </a:r>
+            <a:r>
+              <a:rPr lang="en-US" b="1" dirty="0"/>
+              <a:t>zero-padding</a:t>
+            </a:r>
+            <a:r>
+              <a:rPr lang="en-US" dirty="0"/>
+              <a:t>.  In practice, this is usually done.  Or you can mirror the edge pixels in what’s called </a:t>
+            </a:r>
+            <a:r>
+              <a:rPr lang="en-US" b="1" dirty="0"/>
+              <a:t>mirror-padding</a:t>
+            </a:r>
+            <a:r>
+              <a:rPr lang="en-US" dirty="0"/>
+              <a:t>.</a:t>
             </a:r>
           </a:p>
           <a:p>
@@ -1475,10 +1535,26 @@
             <a:endParaRPr lang="en-US" dirty="0"/>
           </a:p>
           <a:p>
-            <a:pPr algn="l"/>
+            <a:pPr marL="0" marR="0" lvl="0" indent="0" algn="l" defTabSz="914400" rtl="0" eaLnBrk="1" fontAlgn="auto" latinLnBrk="0" hangingPunct="1">
+              <a:lnSpc>
+                <a:spcPct val="100000"/>
+              </a:lnSpc>
+              <a:spcBef>
+                <a:spcPts val="0"/>
+              </a:spcBef>
+              <a:spcAft>
+                <a:spcPts val="0"/>
+              </a:spcAft>
+              <a:buClrTx/>
+              <a:buSzTx/>
+              <a:buFontTx/>
+              <a:buNone/>
+              <a:tabLst/>
+              <a:defRPr/>
+            </a:pPr>
             <a:r>
               <a:rPr lang="en-US" dirty="0"/>
-              <a:t>The thickness of the border depends on the size of the filter. We usually use just enough padding so that the filter can be centered on every element of the input. Every filter needs to have its input padded if we don’t want to lose information from the sides.</a:t>
+              <a:t>The thickness of the border depends on the size of the filter. We typically use just enough padding so that the filter can be centered on every element of the input. Every filter needs to have its input padded if we don’t want to lose information from the sides.</a:t>
             </a:r>
           </a:p>
           <a:p>
@@ -1489,8 +1565,12 @@
             <a:pPr algn="l"/>
             <a:r>
               <a:rPr lang="en-US" dirty="0"/>
-              <a:t>Most deep learning libraries automatically calculate the necessary amount of padding so that our output has the same width and height as our input and apply it for us as a default.</a:t>
-            </a:r>
+              <a:t>Most deep learning libraries automatically calculate the necessary amount of padding.  We don’t have to worry about it!</a:t>
+            </a:r>
+          </a:p>
+          <a:p>
+            <a:pPr algn="l"/>
+            <a:endParaRPr lang="en-US" dirty="0"/>
           </a:p>
         </p:txBody>
       </p:sp>
@@ -2001,28 +2081,6 @@
           <a:bodyPr/>
           <a:lstStyle/>
           <a:p>
-            <a:pPr marL="228600" indent="-228600">
-              <a:buAutoNum type="arabicPeriod"/>
-            </a:pPr>
-            <a:r>
-              <a:rPr lang="en-US" dirty="0">
-                <a:latin typeface="Palatino Linotype" panose="02040502050505030304" pitchFamily="18" charset="0"/>
-              </a:rPr>
-              <a:t>Many kinds of layers – some specific to CNN</a:t>
-            </a:r>
-          </a:p>
-          <a:p>
-            <a:pPr marL="228600" indent="-228600">
-              <a:buAutoNum type="arabicPeriod"/>
-            </a:pPr>
-            <a:r>
-              <a:rPr lang="en-US" dirty="0">
-                <a:latin typeface="Palatino Linotype" panose="02040502050505030304" pitchFamily="18" charset="0"/>
-              </a:rPr>
-              <a:t>Dig into the details of CNN specific operations and layers</a:t>
-            </a:r>
-          </a:p>
-          <a:p>
             <a:endParaRPr lang="en-US" dirty="0"/>
           </a:p>
         </p:txBody>
@@ -2483,7 +2541,7 @@
                 <a:effectLst/>
                 <a:latin typeface="+mn-lt"/>
               </a:rPr>
-              <a:t>CNNs frequently used for image classification – two types:</a:t>
+              <a:t>CNNs are frequently used for image classification – two types:</a:t>
             </a:r>
           </a:p>
           <a:p>
@@ -2528,7 +2586,52 @@
                 <a:effectLst/>
                 <a:latin typeface="+mn-lt"/>
               </a:rPr>
-              <a:t>For predictions, last layer fully connected w/appropriate activation function – see list here</a:t>
+              <a:t>For predictions, last layer fully connected w/appropriate activation function</a:t>
+            </a:r>
+          </a:p>
+          <a:p>
+            <a:pPr marL="685800" lvl="1" indent="-228600" algn="l">
+              <a:buAutoNum type="arabicPeriod"/>
+            </a:pPr>
+            <a:r>
+              <a:rPr lang="en-US" b="0" i="0" dirty="0">
+                <a:solidFill>
+                  <a:srgbClr val="6D737D"/>
+                </a:solidFill>
+                <a:effectLst/>
+                <a:latin typeface="+mn-lt"/>
+              </a:rPr>
+              <a:t>Regression: activation function is usually linear</a:t>
+            </a:r>
+          </a:p>
+          <a:p>
+            <a:pPr marL="685800" lvl="1" indent="-228600" algn="l">
+              <a:buAutoNum type="arabicPeriod"/>
+            </a:pPr>
+            <a:r>
+              <a:rPr lang="en-US" b="0" i="0" dirty="0">
+                <a:solidFill>
+                  <a:srgbClr val="6D737D"/>
+                </a:solidFill>
+                <a:effectLst/>
+                <a:latin typeface="+mn-lt"/>
+              </a:rPr>
+              <a:t>Binary: activation is sigmoid – you’ll see this in our next exercise</a:t>
+            </a:r>
+          </a:p>
+          <a:p>
+            <a:pPr marL="685800" lvl="1" indent="-228600" algn="l">
+              <a:buAutoNum type="arabicPeriod"/>
+            </a:pPr>
+            <a:r>
+              <a:rPr lang="en-US" b="0" i="0" dirty="0">
+                <a:solidFill>
+                  <a:srgbClr val="6D737D"/>
+                </a:solidFill>
+                <a:effectLst/>
+                <a:latin typeface="+mn-lt"/>
+              </a:rPr>
+              <a:t>Multi-class: activation is softmax – calculates the probability for each class, with all those probabilities summing to one</a:t>
             </a:r>
           </a:p>
           <a:p>
@@ -2718,21 +2821,26 @@
           <a:bodyPr/>
           <a:lstStyle/>
           <a:p>
-            <a:pPr marL="228600" indent="-228600">
-              <a:buAutoNum type="arabicPeriod"/>
+            <a:pPr marL="0" marR="0" lvl="0" indent="0" algn="l" defTabSz="939363" rtl="0" eaLnBrk="1" fontAlgn="auto" latinLnBrk="0" hangingPunct="1">
+              <a:lnSpc>
+                <a:spcPct val="100000"/>
+              </a:lnSpc>
+              <a:spcBef>
+                <a:spcPts val="0"/>
+              </a:spcBef>
+              <a:spcAft>
+                <a:spcPts val="0"/>
+              </a:spcAft>
+              <a:buClrTx/>
+              <a:buSzTx/>
+              <a:buFontTx/>
+              <a:buNone/>
+              <a:tabLst/>
+              <a:defRPr/>
             </a:pPr>
             <a:r>
               <a:rPr lang="en-US" dirty="0"/>
-              <a:t>Post general questions (entire class) in Chat…</a:t>
-            </a:r>
-          </a:p>
-          <a:p>
-            <a:pPr marL="228600" indent="-228600">
-              <a:buAutoNum type="arabicPeriod"/>
-            </a:pPr>
-            <a:r>
-              <a:rPr lang="en-US" dirty="0"/>
-              <a:t>Discuss specific implementation questions at the Help table during exercise…</a:t>
+              <a:t>The learning experience for this exercise starts on page 130 of the textbook.  </a:t>
             </a:r>
           </a:p>
           <a:p>
@@ -2766,7 +2874,7 @@
     </p:spTree>
     <p:extLst>
       <p:ext uri="{BB962C8B-B14F-4D97-AF65-F5344CB8AC3E}">
-        <p14:creationId xmlns:p14="http://schemas.microsoft.com/office/powerpoint/2010/main" val="851494294"/>
+        <p14:creationId xmlns:p14="http://schemas.microsoft.com/office/powerpoint/2010/main" val="1401395996"/>
       </p:ext>
     </p:extLst>
   </p:cSld>
@@ -2820,26 +2928,21 @@
           <a:bodyPr/>
           <a:lstStyle/>
           <a:p>
-            <a:pPr marL="0" marR="0" lvl="0" indent="0" algn="l" defTabSz="939363" rtl="0" eaLnBrk="1" fontAlgn="auto" latinLnBrk="0" hangingPunct="1">
-              <a:lnSpc>
-                <a:spcPct val="100000"/>
-              </a:lnSpc>
-              <a:spcBef>
-                <a:spcPts val="0"/>
-              </a:spcBef>
-              <a:spcAft>
-                <a:spcPts val="0"/>
-              </a:spcAft>
-              <a:buClrTx/>
-              <a:buSzTx/>
-              <a:buFontTx/>
-              <a:buNone/>
-              <a:tabLst/>
-              <a:defRPr/>
+            <a:pPr marL="228600" indent="-228600">
+              <a:buAutoNum type="arabicPeriod"/>
             </a:pPr>
             <a:r>
               <a:rPr lang="en-US" dirty="0"/>
-              <a:t>The learning experience for this exercise starts on page 130 of the textbook.  </a:t>
+              <a:t>Post general questions (entire class) in Chat…</a:t>
+            </a:r>
+          </a:p>
+          <a:p>
+            <a:pPr marL="228600" indent="-228600">
+              <a:buAutoNum type="arabicPeriod"/>
+            </a:pPr>
+            <a:r>
+              <a:rPr lang="en-US" dirty="0"/>
+              <a:t>Discuss specific implementation questions at the Help table during exercise…</a:t>
             </a:r>
           </a:p>
           <a:p>
@@ -2873,7 +2976,7 @@
     </p:spTree>
     <p:extLst>
       <p:ext uri="{BB962C8B-B14F-4D97-AF65-F5344CB8AC3E}">
-        <p14:creationId xmlns:p14="http://schemas.microsoft.com/office/powerpoint/2010/main" val="1401395996"/>
+        <p14:creationId xmlns:p14="http://schemas.microsoft.com/office/powerpoint/2010/main" val="851494294"/>
       </p:ext>
     </p:extLst>
   </p:cSld>
@@ -3313,7 +3416,7 @@
                 <a:effectLst/>
                 <a:latin typeface="+mn-lt"/>
               </a:rPr>
-              <a:t>Model pictured here classifies handwritten digits – famous MNIST digits dataset</a:t>
+              <a:t>Model pictured here classifies handwritten digits – famous MNIST digits dataset – we already introduced you to this model in our last session. </a:t>
             </a:r>
           </a:p>
           <a:p>
@@ -3343,7 +3446,7 @@
                 <a:effectLst/>
                 <a:latin typeface="+mn-lt"/>
               </a:rPr>
-              <a:t>Final two layers are fully connected – discussed in our beginner sequence</a:t>
+              <a:t>Final two layers are fully connected – discussed in our beginner sequence.</a:t>
             </a:r>
           </a:p>
           <a:p>
@@ -3594,13 +3697,13 @@
               <a:rPr lang="en-US" dirty="0">
                 <a:latin typeface="+mn-lt"/>
               </a:rPr>
-              <a:t>Left: When our tensor has one or three channels, we often say that it’s made up of </a:t>
+              <a:t>Left: When our tensor has one to three channels, we call each point a </a:t>
             </a:r>
             <a:r>
               <a:rPr lang="en-US" b="1" dirty="0">
                 <a:latin typeface="+mn-lt"/>
               </a:rPr>
-              <a:t>pixels</a:t>
+              <a:t>pixel</a:t>
             </a:r>
           </a:p>
           <a:p>
@@ -3713,27 +3816,6 @@
             <a:endParaRPr lang="en-US" dirty="0">
               <a:latin typeface="+mn-lt"/>
             </a:endParaRPr>
-          </a:p>
-          <a:p>
-            <a:r>
-              <a:rPr lang="en-US" dirty="0">
-                <a:latin typeface="+mn-lt"/>
-              </a:rPr>
-              <a:t>Left: When our tensor has one or three channels, we often say that it’s made up of pixels. </a:t>
-            </a:r>
-          </a:p>
-          <a:p>
-            <a:endParaRPr lang="en-US" dirty="0">
-              <a:latin typeface="+mn-lt"/>
-            </a:endParaRPr>
-          </a:p>
-          <a:p>
-            <a:r>
-              <a:rPr lang="en-US" dirty="0">
-                <a:latin typeface="+mn-lt"/>
-              </a:rPr>
-              <a:t>Right: For tensors with many channels, we call each slice through the channels an element</a:t>
-            </a:r>
           </a:p>
         </p:txBody>
       </p:sp>
@@ -3822,7 +3904,7 @@
             </a:pPr>
             <a:r>
               <a:rPr lang="en-US" dirty="0"/>
-              <a:t>Process a color image – each pixel in our image contains three numbers: one each for red, green, and blue</a:t>
+              <a:t>Let’s pretend we want to take a color image and create a greyscale image where the amount of white corresponds to yellow in the original.</a:t>
             </a:r>
           </a:p>
           <a:p>
@@ -3831,7 +3913,7 @@
             </a:pPr>
             <a:r>
               <a:rPr lang="en-US" dirty="0"/>
-              <a:t>(Example) create greyscale output with same width / height but where amount of white corresponds to yellow in original image.</a:t>
+              <a:t>Process a color image – each pixel in our image contains three numbers: one each for red, green, and blue</a:t>
             </a:r>
           </a:p>
           <a:p>
@@ -3840,7 +3922,7 @@
             </a:pPr>
             <a:r>
               <a:rPr lang="en-US" dirty="0"/>
-              <a:t>RGB values – -1 to 1.</a:t>
+              <a:t>For simplicity, let’s assume our RGB values are from -1 to 1.</a:t>
             </a:r>
           </a:p>
           <a:p>
@@ -3876,7 +3958,7 @@
             </a:pPr>
             <a:r>
               <a:rPr lang="en-US" dirty="0"/>
-              <a:t>Artificial neuron: +1, +1, and -1 are weights – fed into the net input (summation) function before activation function</a:t>
+              <a:t>As shown here, the +1, +1, and -1 boxes are weights – these are multiplied by each pixel value and then summed up by the net input (summation) function before being passed off to the activation function</a:t>
             </a:r>
           </a:p>
           <a:p>
@@ -4419,7 +4501,7 @@
           <a:p>
             <a:r>
               <a:rPr lang="en-US" dirty="0"/>
-              <a:t>So far, we’ve been sweeping our neuron over the image, processing one pixel at a time, using only that pixel’s values for input. In many situations, it’s also useful to look at the pixels near the one we’re processing. Usually, we consider a pixel’s eight immediate neighbors. That is, we use the values in a little three by three box that’s centered on the pixel.</a:t>
+              <a:t>So far, we’ve been sweeping a single neuron over the image, processing one pixel at a time. But in many situations, it’s also useful to look at the pixels near the one we’re processing. Usually, we consider a pixel’s eight immediate neighbors. That is, we use the values in a little three by three box that’s centered on the pixel.</a:t>
             </a:r>
           </a:p>
           <a:p>
@@ -4428,7 +4510,7 @@
           <a:p>
             <a:r>
               <a:rPr lang="en-US" dirty="0"/>
-              <a:t>This figure shows three different operations we can apply using a three-by-three block of numbers in this way: </a:t>
+              <a:t>This figure shows three different operations we can apply using a three-by-three filter or kernel: </a:t>
             </a:r>
           </a:p>
           <a:p>
@@ -4652,7 +4734,7 @@
           <a:p>
             <a:fld id="{C3F78080-8D0A-4BE8-A5B4-CB115102D524}" type="datetimeFigureOut">
               <a:rPr lang="en-US" smtClean="0"/>
-              <a:t>9/12/2022</a:t>
+              <a:t>9/15/2022</a:t>
             </a:fld>
             <a:endParaRPr lang="en-US"/>
           </a:p>
@@ -4850,7 +4932,7 @@
           <a:p>
             <a:fld id="{C3F78080-8D0A-4BE8-A5B4-CB115102D524}" type="datetimeFigureOut">
               <a:rPr lang="en-US" smtClean="0"/>
-              <a:t>9/12/2022</a:t>
+              <a:t>9/15/2022</a:t>
             </a:fld>
             <a:endParaRPr lang="en-US"/>
           </a:p>
@@ -5058,7 +5140,7 @@
           <a:p>
             <a:fld id="{C3F78080-8D0A-4BE8-A5B4-CB115102D524}" type="datetimeFigureOut">
               <a:rPr lang="en-US" smtClean="0"/>
-              <a:t>9/12/2022</a:t>
+              <a:t>9/15/2022</a:t>
             </a:fld>
             <a:endParaRPr lang="en-US"/>
           </a:p>
@@ -5256,7 +5338,7 @@
           <a:p>
             <a:fld id="{C3F78080-8D0A-4BE8-A5B4-CB115102D524}" type="datetimeFigureOut">
               <a:rPr lang="en-US" smtClean="0"/>
-              <a:t>9/12/2022</a:t>
+              <a:t>9/15/2022</a:t>
             </a:fld>
             <a:endParaRPr lang="en-US"/>
           </a:p>
@@ -5531,7 +5613,7 @@
           <a:p>
             <a:fld id="{C3F78080-8D0A-4BE8-A5B4-CB115102D524}" type="datetimeFigureOut">
               <a:rPr lang="en-US" smtClean="0"/>
-              <a:t>9/12/2022</a:t>
+              <a:t>9/15/2022</a:t>
             </a:fld>
             <a:endParaRPr lang="en-US"/>
           </a:p>
@@ -5796,7 +5878,7 @@
           <a:p>
             <a:fld id="{C3F78080-8D0A-4BE8-A5B4-CB115102D524}" type="datetimeFigureOut">
               <a:rPr lang="en-US" smtClean="0"/>
-              <a:t>9/12/2022</a:t>
+              <a:t>9/15/2022</a:t>
             </a:fld>
             <a:endParaRPr lang="en-US"/>
           </a:p>
@@ -6208,7 +6290,7 @@
           <a:p>
             <a:fld id="{C3F78080-8D0A-4BE8-A5B4-CB115102D524}" type="datetimeFigureOut">
               <a:rPr lang="en-US" smtClean="0"/>
-              <a:t>9/12/2022</a:t>
+              <a:t>9/15/2022</a:t>
             </a:fld>
             <a:endParaRPr lang="en-US"/>
           </a:p>
@@ -6349,7 +6431,7 @@
           <a:p>
             <a:fld id="{C3F78080-8D0A-4BE8-A5B4-CB115102D524}" type="datetimeFigureOut">
               <a:rPr lang="en-US" smtClean="0"/>
-              <a:t>9/12/2022</a:t>
+              <a:t>9/15/2022</a:t>
             </a:fld>
             <a:endParaRPr lang="en-US"/>
           </a:p>
@@ -6462,7 +6544,7 @@
           <a:p>
             <a:fld id="{C3F78080-8D0A-4BE8-A5B4-CB115102D524}" type="datetimeFigureOut">
               <a:rPr lang="en-US" smtClean="0"/>
-              <a:t>9/12/2022</a:t>
+              <a:t>9/15/2022</a:t>
             </a:fld>
             <a:endParaRPr lang="en-US"/>
           </a:p>
@@ -6773,7 +6855,7 @@
           <a:p>
             <a:fld id="{C3F78080-8D0A-4BE8-A5B4-CB115102D524}" type="datetimeFigureOut">
               <a:rPr lang="en-US" smtClean="0"/>
-              <a:t>9/12/2022</a:t>
+              <a:t>9/15/2022</a:t>
             </a:fld>
             <a:endParaRPr lang="en-US"/>
           </a:p>
@@ -7061,7 +7143,7 @@
           <a:p>
             <a:fld id="{C3F78080-8D0A-4BE8-A5B4-CB115102D524}" type="datetimeFigureOut">
               <a:rPr lang="en-US" smtClean="0"/>
-              <a:t>9/12/2022</a:t>
+              <a:t>9/15/2022</a:t>
             </a:fld>
             <a:endParaRPr lang="en-US"/>
           </a:p>
@@ -7302,7 +7384,7 @@
           <a:p>
             <a:fld id="{C3F78080-8D0A-4BE8-A5B4-CB115102D524}" type="datetimeFigureOut">
               <a:rPr lang="en-US" smtClean="0"/>
-              <a:t>9/12/2022</a:t>
+              <a:t>9/15/2022</a:t>
             </a:fld>
             <a:endParaRPr lang="en-US"/>
           </a:p>
@@ -13059,7 +13141,7 @@
                 </a:solidFill>
                 <a:latin typeface="Palatino Linotype" panose="02040502050505030304" pitchFamily="18" charset="0"/>
               </a:rPr>
-              <a:t>Pixels and Filters</a:t>
+              <a:t>Images and Filters</a:t>
             </a:r>
           </a:p>
         </p:txBody>
@@ -13081,6 +13163,228 @@
         <p:spPr>
           <a:xfrm>
             <a:off x="1013564" y="3103930"/>
+            <a:ext cx="10515600" cy="504215"/>
+          </a:xfrm>
+          <a:prstGeom prst="rect">
+            <a:avLst/>
+          </a:prstGeom>
+        </p:spPr>
+        <p:txBody>
+          <a:bodyPr vert="horz" lIns="91440" tIns="45720" rIns="91440" bIns="45720" rtlCol="0">
+            <a:normAutofit/>
+          </a:bodyPr>
+          <a:lstStyle>
+            <a:lvl1pPr marL="228600" indent="-228600" algn="l" defTabSz="914400" rtl="0" eaLnBrk="1" latinLnBrk="0" hangingPunct="1">
+              <a:lnSpc>
+                <a:spcPct val="90000"/>
+              </a:lnSpc>
+              <a:spcBef>
+                <a:spcPts val="1000"/>
+              </a:spcBef>
+              <a:buFont typeface="Arial" panose="020B0604020202020204" pitchFamily="34" charset="0"/>
+              <a:buChar char="•"/>
+              <a:defRPr sz="2800" kern="1200">
+                <a:solidFill>
+                  <a:schemeClr val="tx1"/>
+                </a:solidFill>
+                <a:latin typeface="+mn-lt"/>
+                <a:ea typeface="+mn-ea"/>
+                <a:cs typeface="+mn-cs"/>
+              </a:defRPr>
+            </a:lvl1pPr>
+            <a:lvl2pPr marL="685800" indent="-228600" algn="l" defTabSz="914400" rtl="0" eaLnBrk="1" latinLnBrk="0" hangingPunct="1">
+              <a:lnSpc>
+                <a:spcPct val="90000"/>
+              </a:lnSpc>
+              <a:spcBef>
+                <a:spcPts val="500"/>
+              </a:spcBef>
+              <a:buFont typeface="Arial" panose="020B0604020202020204" pitchFamily="34" charset="0"/>
+              <a:buChar char="•"/>
+              <a:defRPr sz="2400" kern="1200">
+                <a:solidFill>
+                  <a:schemeClr val="tx1"/>
+                </a:solidFill>
+                <a:latin typeface="+mn-lt"/>
+                <a:ea typeface="+mn-ea"/>
+                <a:cs typeface="+mn-cs"/>
+              </a:defRPr>
+            </a:lvl2pPr>
+            <a:lvl3pPr marL="1143000" indent="-228600" algn="l" defTabSz="914400" rtl="0" eaLnBrk="1" latinLnBrk="0" hangingPunct="1">
+              <a:lnSpc>
+                <a:spcPct val="90000"/>
+              </a:lnSpc>
+              <a:spcBef>
+                <a:spcPts val="500"/>
+              </a:spcBef>
+              <a:buFont typeface="Arial" panose="020B0604020202020204" pitchFamily="34" charset="0"/>
+              <a:buChar char="•"/>
+              <a:defRPr sz="2000" kern="1200">
+                <a:solidFill>
+                  <a:schemeClr val="tx1"/>
+                </a:solidFill>
+                <a:latin typeface="+mn-lt"/>
+                <a:ea typeface="+mn-ea"/>
+                <a:cs typeface="+mn-cs"/>
+              </a:defRPr>
+            </a:lvl3pPr>
+            <a:lvl4pPr marL="1600200" indent="-228600" algn="l" defTabSz="914400" rtl="0" eaLnBrk="1" latinLnBrk="0" hangingPunct="1">
+              <a:lnSpc>
+                <a:spcPct val="90000"/>
+              </a:lnSpc>
+              <a:spcBef>
+                <a:spcPts val="500"/>
+              </a:spcBef>
+              <a:buFont typeface="Arial" panose="020B0604020202020204" pitchFamily="34" charset="0"/>
+              <a:buChar char="•"/>
+              <a:defRPr sz="1800" kern="1200">
+                <a:solidFill>
+                  <a:schemeClr val="tx1"/>
+                </a:solidFill>
+                <a:latin typeface="+mn-lt"/>
+                <a:ea typeface="+mn-ea"/>
+                <a:cs typeface="+mn-cs"/>
+              </a:defRPr>
+            </a:lvl4pPr>
+            <a:lvl5pPr marL="2057400" indent="-228600" algn="l" defTabSz="914400" rtl="0" eaLnBrk="1" latinLnBrk="0" hangingPunct="1">
+              <a:lnSpc>
+                <a:spcPct val="90000"/>
+              </a:lnSpc>
+              <a:spcBef>
+                <a:spcPts val="500"/>
+              </a:spcBef>
+              <a:buFont typeface="Arial" panose="020B0604020202020204" pitchFamily="34" charset="0"/>
+              <a:buChar char="•"/>
+              <a:defRPr sz="1800" kern="1200">
+                <a:solidFill>
+                  <a:schemeClr val="tx1"/>
+                </a:solidFill>
+                <a:latin typeface="+mn-lt"/>
+                <a:ea typeface="+mn-ea"/>
+                <a:cs typeface="+mn-cs"/>
+              </a:defRPr>
+            </a:lvl5pPr>
+            <a:lvl6pPr marL="2514600" indent="-228600" algn="l" defTabSz="914400" rtl="0" eaLnBrk="1" latinLnBrk="0" hangingPunct="1">
+              <a:lnSpc>
+                <a:spcPct val="90000"/>
+              </a:lnSpc>
+              <a:spcBef>
+                <a:spcPts val="500"/>
+              </a:spcBef>
+              <a:buFont typeface="Arial" panose="020B0604020202020204" pitchFamily="34" charset="0"/>
+              <a:buChar char="•"/>
+              <a:defRPr sz="1800" kern="1200">
+                <a:solidFill>
+                  <a:schemeClr val="tx1"/>
+                </a:solidFill>
+                <a:latin typeface="+mn-lt"/>
+                <a:ea typeface="+mn-ea"/>
+                <a:cs typeface="+mn-cs"/>
+              </a:defRPr>
+            </a:lvl6pPr>
+            <a:lvl7pPr marL="2971800" indent="-228600" algn="l" defTabSz="914400" rtl="0" eaLnBrk="1" latinLnBrk="0" hangingPunct="1">
+              <a:lnSpc>
+                <a:spcPct val="90000"/>
+              </a:lnSpc>
+              <a:spcBef>
+                <a:spcPts val="500"/>
+              </a:spcBef>
+              <a:buFont typeface="Arial" panose="020B0604020202020204" pitchFamily="34" charset="0"/>
+              <a:buChar char="•"/>
+              <a:defRPr sz="1800" kern="1200">
+                <a:solidFill>
+                  <a:schemeClr val="tx1"/>
+                </a:solidFill>
+                <a:latin typeface="+mn-lt"/>
+                <a:ea typeface="+mn-ea"/>
+                <a:cs typeface="+mn-cs"/>
+              </a:defRPr>
+            </a:lvl7pPr>
+            <a:lvl8pPr marL="3429000" indent="-228600" algn="l" defTabSz="914400" rtl="0" eaLnBrk="1" latinLnBrk="0" hangingPunct="1">
+              <a:lnSpc>
+                <a:spcPct val="90000"/>
+              </a:lnSpc>
+              <a:spcBef>
+                <a:spcPts val="500"/>
+              </a:spcBef>
+              <a:buFont typeface="Arial" panose="020B0604020202020204" pitchFamily="34" charset="0"/>
+              <a:buChar char="•"/>
+              <a:defRPr sz="1800" kern="1200">
+                <a:solidFill>
+                  <a:schemeClr val="tx1"/>
+                </a:solidFill>
+                <a:latin typeface="+mn-lt"/>
+                <a:ea typeface="+mn-ea"/>
+                <a:cs typeface="+mn-cs"/>
+              </a:defRPr>
+            </a:lvl8pPr>
+            <a:lvl9pPr marL="3886200" indent="-228600" algn="l" defTabSz="914400" rtl="0" eaLnBrk="1" latinLnBrk="0" hangingPunct="1">
+              <a:lnSpc>
+                <a:spcPct val="90000"/>
+              </a:lnSpc>
+              <a:spcBef>
+                <a:spcPts val="500"/>
+              </a:spcBef>
+              <a:buFont typeface="Arial" panose="020B0604020202020204" pitchFamily="34" charset="0"/>
+              <a:buChar char="•"/>
+              <a:defRPr sz="1800" kern="1200">
+                <a:solidFill>
+                  <a:schemeClr val="tx1"/>
+                </a:solidFill>
+                <a:latin typeface="+mn-lt"/>
+                <a:ea typeface="+mn-ea"/>
+                <a:cs typeface="+mn-cs"/>
+              </a:defRPr>
+            </a:lvl9pPr>
+          </a:lstStyle>
+          <a:p>
+            <a:pPr>
+              <a:buFont typeface="Wingdings" panose="05000000000000000000" pitchFamily="2" charset="2"/>
+              <a:buChar char="Ø"/>
+            </a:pPr>
+            <a:r>
+              <a:rPr lang="en-US" dirty="0">
+                <a:solidFill>
+                  <a:schemeClr val="tx1">
+                    <a:lumMod val="75000"/>
+                    <a:lumOff val="25000"/>
+                  </a:schemeClr>
+                </a:solidFill>
+              </a:rPr>
+              <a:t> </a:t>
+            </a:r>
+            <a:r>
+              <a:rPr lang="en-US" dirty="0">
+                <a:solidFill>
+                  <a:schemeClr val="tx1">
+                    <a:lumMod val="75000"/>
+                    <a:lumOff val="25000"/>
+                  </a:schemeClr>
+                </a:solidFill>
+                <a:latin typeface="Palatino Linotype" panose="02040502050505030304" pitchFamily="18" charset="0"/>
+              </a:rPr>
+              <a:t>Convolution</a:t>
+            </a:r>
+          </a:p>
+        </p:txBody>
+      </p:sp>
+      <p:sp>
+        <p:nvSpPr>
+          <p:cNvPr id="7" name="Content Placeholder 2">
+            <a:extLst>
+              <a:ext uri="{FF2B5EF4-FFF2-40B4-BE49-F238E27FC236}">
+                <a16:creationId xmlns:a16="http://schemas.microsoft.com/office/drawing/2014/main" id="{5B95ACA0-3AD3-8719-93E2-6F228B1E1ED2}"/>
+              </a:ext>
+            </a:extLst>
+          </p:cNvPr>
+          <p:cNvSpPr txBox="1">
+            <a:spLocks/>
+          </p:cNvSpPr>
+          <p:nvPr/>
+        </p:nvSpPr>
+        <p:spPr>
+          <a:xfrm>
+            <a:off x="1013564" y="3743082"/>
             <a:ext cx="10515600" cy="504215"/>
           </a:xfrm>
           <a:prstGeom prst="rect">
@@ -14343,6 +14647,197 @@
       </p:grpSpPr>
       <p:sp>
         <p:nvSpPr>
+          <p:cNvPr id="3" name="Text Placeholder 2">
+            <a:extLst>
+              <a:ext uri="{FF2B5EF4-FFF2-40B4-BE49-F238E27FC236}">
+                <a16:creationId xmlns:a16="http://schemas.microsoft.com/office/drawing/2014/main" id="{098BC2D2-CCF7-4C63-8489-B46BF394FCA2}"/>
+              </a:ext>
+            </a:extLst>
+          </p:cNvPr>
+          <p:cNvSpPr>
+            <a:spLocks noGrp="1"/>
+          </p:cNvSpPr>
+          <p:nvPr>
+            <p:ph type="body" idx="1"/>
+          </p:nvPr>
+        </p:nvSpPr>
+        <p:spPr>
+          <a:xfrm>
+            <a:off x="0" y="4285400"/>
+            <a:ext cx="12192000" cy="518830"/>
+          </a:xfrm>
+        </p:spPr>
+        <p:txBody>
+          <a:bodyPr>
+            <a:normAutofit/>
+          </a:bodyPr>
+          <a:lstStyle/>
+          <a:p>
+            <a:endParaRPr lang="en-US" dirty="0">
+              <a:latin typeface="Palatino Linotype" panose="02040502050505030304" pitchFamily="18" charset="0"/>
+              <a:cs typeface="Segoe UI" panose="020B0502040204020203" pitchFamily="34" charset="0"/>
+            </a:endParaRPr>
+          </a:p>
+          <a:p>
+            <a:endParaRPr lang="en-US" dirty="0">
+              <a:latin typeface="Palatino Linotype" panose="02040502050505030304" pitchFamily="18" charset="0"/>
+              <a:cs typeface="Segoe UI" panose="020B0502040204020203" pitchFamily="34" charset="0"/>
+            </a:endParaRPr>
+          </a:p>
+          <a:p>
+            <a:endParaRPr lang="en-US" dirty="0">
+              <a:latin typeface="Palatino Linotype" panose="02040502050505030304" pitchFamily="18" charset="0"/>
+              <a:cs typeface="Segoe UI" panose="020B0502040204020203" pitchFamily="34" charset="0"/>
+            </a:endParaRPr>
+          </a:p>
+          <a:p>
+            <a:endParaRPr lang="en-US" dirty="0">
+              <a:latin typeface="Palatino Linotype" panose="02040502050505030304" pitchFamily="18" charset="0"/>
+              <a:cs typeface="Segoe UI" panose="020B0502040204020203" pitchFamily="34" charset="0"/>
+            </a:endParaRPr>
+          </a:p>
+          <a:p>
+            <a:endParaRPr lang="en-US" dirty="0">
+              <a:latin typeface="Palatino Linotype" panose="02040502050505030304" pitchFamily="18" charset="0"/>
+              <a:cs typeface="Segoe UI" panose="020B0502040204020203" pitchFamily="34" charset="0"/>
+            </a:endParaRPr>
+          </a:p>
+        </p:txBody>
+      </p:sp>
+      <p:pic>
+        <p:nvPicPr>
+          <p:cNvPr id="4" name="Picture 3">
+            <a:extLst>
+              <a:ext uri="{FF2B5EF4-FFF2-40B4-BE49-F238E27FC236}">
+                <a16:creationId xmlns:a16="http://schemas.microsoft.com/office/drawing/2014/main" id="{BF227EC8-F25E-46CD-8CAE-24E18DBDE5CC}"/>
+              </a:ext>
+            </a:extLst>
+          </p:cNvPr>
+          <p:cNvPicPr>
+            <a:picLocks noChangeAspect="1"/>
+          </p:cNvPicPr>
+          <p:nvPr/>
+        </p:nvPicPr>
+        <p:blipFill>
+          <a:blip r:embed="rId3"/>
+          <a:stretch>
+            <a:fillRect/>
+          </a:stretch>
+        </p:blipFill>
+        <p:spPr>
+          <a:xfrm>
+            <a:off x="0" y="365760"/>
+            <a:ext cx="3233668" cy="805144"/>
+          </a:xfrm>
+          <a:prstGeom prst="rect">
+            <a:avLst/>
+          </a:prstGeom>
+        </p:spPr>
+      </p:pic>
+      <p:sp>
+        <p:nvSpPr>
+          <p:cNvPr id="5" name="TextBox 4">
+            <a:extLst>
+              <a:ext uri="{FF2B5EF4-FFF2-40B4-BE49-F238E27FC236}">
+                <a16:creationId xmlns:a16="http://schemas.microsoft.com/office/drawing/2014/main" id="{8760F1F0-4F7C-4834-B8EC-922F9AF83899}"/>
+              </a:ext>
+            </a:extLst>
+          </p:cNvPr>
+          <p:cNvSpPr txBox="1"/>
+          <p:nvPr/>
+        </p:nvSpPr>
+        <p:spPr>
+          <a:xfrm>
+            <a:off x="0" y="3291840"/>
+            <a:ext cx="12192000" cy="1200329"/>
+          </a:xfrm>
+          <a:prstGeom prst="rect">
+            <a:avLst/>
+          </a:prstGeom>
+          <a:noFill/>
+        </p:spPr>
+        <p:txBody>
+          <a:bodyPr wrap="square" rtlCol="0">
+            <a:spAutoFit/>
+          </a:bodyPr>
+          <a:lstStyle/>
+          <a:p>
+            <a:pPr algn="ctr"/>
+            <a:r>
+              <a:rPr lang="en-US" sz="3600" dirty="0">
+                <a:solidFill>
+                  <a:schemeClr val="tx1">
+                    <a:lumMod val="65000"/>
+                    <a:lumOff val="35000"/>
+                  </a:schemeClr>
+                </a:solidFill>
+                <a:latin typeface="Palatino Linotype" panose="02040502050505030304" pitchFamily="18" charset="0"/>
+              </a:rPr>
+              <a:t>A Cat &amp; Dog Classifier</a:t>
+            </a:r>
+          </a:p>
+          <a:p>
+            <a:pPr algn="ctr"/>
+            <a:r>
+              <a:rPr lang="en-US" sz="3600" dirty="0">
+                <a:solidFill>
+                  <a:schemeClr val="tx1">
+                    <a:lumMod val="65000"/>
+                    <a:lumOff val="35000"/>
+                  </a:schemeClr>
+                </a:solidFill>
+                <a:latin typeface="Palatino Linotype" panose="02040502050505030304" pitchFamily="18" charset="0"/>
+              </a:rPr>
+              <a:t>02.2_catdog.ipynb</a:t>
+            </a:r>
+            <a:endParaRPr lang="en-US" sz="3600" dirty="0"/>
+          </a:p>
+        </p:txBody>
+      </p:sp>
+    </p:spTree>
+    <p:extLst>
+      <p:ext uri="{BB962C8B-B14F-4D97-AF65-F5344CB8AC3E}">
+        <p14:creationId xmlns:p14="http://schemas.microsoft.com/office/powerpoint/2010/main" val="4096204018"/>
+      </p:ext>
+    </p:extLst>
+  </p:cSld>
+  <p:clrMapOvr>
+    <a:masterClrMapping/>
+  </p:clrMapOvr>
+  <mc:AlternateContent xmlns:mc="http://schemas.openxmlformats.org/markup-compatibility/2006" xmlns:p14="http://schemas.microsoft.com/office/powerpoint/2010/main">
+    <mc:Choice Requires="p14">
+      <p:transition spd="med" p14:dur="700">
+        <p:fade/>
+      </p:transition>
+    </mc:Choice>
+    <mc:Fallback xmlns="">
+      <p:transition spd="med">
+        <p:fade/>
+      </p:transition>
+    </mc:Fallback>
+  </mc:AlternateContent>
+</p:sld>
+</file>
+
+<file path=ppt/slides/slide25.xml><?xml version="1.0" encoding="utf-8"?>
+<p:sld xmlns:a="http://schemas.openxmlformats.org/drawingml/2006/main" xmlns:r="http://schemas.openxmlformats.org/officeDocument/2006/relationships" xmlns:p="http://schemas.openxmlformats.org/presentationml/2006/main">
+  <p:cSld>
+    <p:spTree>
+      <p:nvGrpSpPr>
+        <p:cNvPr id="1" name=""/>
+        <p:cNvGrpSpPr/>
+        <p:nvPr/>
+      </p:nvGrpSpPr>
+      <p:grpSpPr>
+        <a:xfrm>
+          <a:off x="0" y="0"/>
+          <a:ext cx="0" cy="0"/>
+          <a:chOff x="0" y="0"/>
+          <a:chExt cx="0" cy="0"/>
+        </a:xfrm>
+      </p:grpSpPr>
+      <p:sp>
+        <p:nvSpPr>
           <p:cNvPr id="2" name="Title 1">
             <a:extLst>
               <a:ext uri="{FF2B5EF4-FFF2-40B4-BE49-F238E27FC236}">
@@ -14443,197 +14938,6 @@
     </mc:Choice>
     <mc:Fallback xmlns="">
       <p:transition spd="slow">
-        <p:fade/>
-      </p:transition>
-    </mc:Fallback>
-  </mc:AlternateContent>
-</p:sld>
-</file>
-
-<file path=ppt/slides/slide25.xml><?xml version="1.0" encoding="utf-8"?>
-<p:sld xmlns:a="http://schemas.openxmlformats.org/drawingml/2006/main" xmlns:r="http://schemas.openxmlformats.org/officeDocument/2006/relationships" xmlns:p="http://schemas.openxmlformats.org/presentationml/2006/main">
-  <p:cSld>
-    <p:spTree>
-      <p:nvGrpSpPr>
-        <p:cNvPr id="1" name=""/>
-        <p:cNvGrpSpPr/>
-        <p:nvPr/>
-      </p:nvGrpSpPr>
-      <p:grpSpPr>
-        <a:xfrm>
-          <a:off x="0" y="0"/>
-          <a:ext cx="0" cy="0"/>
-          <a:chOff x="0" y="0"/>
-          <a:chExt cx="0" cy="0"/>
-        </a:xfrm>
-      </p:grpSpPr>
-      <p:sp>
-        <p:nvSpPr>
-          <p:cNvPr id="3" name="Text Placeholder 2">
-            <a:extLst>
-              <a:ext uri="{FF2B5EF4-FFF2-40B4-BE49-F238E27FC236}">
-                <a16:creationId xmlns:a16="http://schemas.microsoft.com/office/drawing/2014/main" id="{098BC2D2-CCF7-4C63-8489-B46BF394FCA2}"/>
-              </a:ext>
-            </a:extLst>
-          </p:cNvPr>
-          <p:cNvSpPr>
-            <a:spLocks noGrp="1"/>
-          </p:cNvSpPr>
-          <p:nvPr>
-            <p:ph type="body" idx="1"/>
-          </p:nvPr>
-        </p:nvSpPr>
-        <p:spPr>
-          <a:xfrm>
-            <a:off x="0" y="4285400"/>
-            <a:ext cx="12192000" cy="518830"/>
-          </a:xfrm>
-        </p:spPr>
-        <p:txBody>
-          <a:bodyPr>
-            <a:normAutofit/>
-          </a:bodyPr>
-          <a:lstStyle/>
-          <a:p>
-            <a:endParaRPr lang="en-US" dirty="0">
-              <a:latin typeface="Palatino Linotype" panose="02040502050505030304" pitchFamily="18" charset="0"/>
-              <a:cs typeface="Segoe UI" panose="020B0502040204020203" pitchFamily="34" charset="0"/>
-            </a:endParaRPr>
-          </a:p>
-          <a:p>
-            <a:endParaRPr lang="en-US" dirty="0">
-              <a:latin typeface="Palatino Linotype" panose="02040502050505030304" pitchFamily="18" charset="0"/>
-              <a:cs typeface="Segoe UI" panose="020B0502040204020203" pitchFamily="34" charset="0"/>
-            </a:endParaRPr>
-          </a:p>
-          <a:p>
-            <a:endParaRPr lang="en-US" dirty="0">
-              <a:latin typeface="Palatino Linotype" panose="02040502050505030304" pitchFamily="18" charset="0"/>
-              <a:cs typeface="Segoe UI" panose="020B0502040204020203" pitchFamily="34" charset="0"/>
-            </a:endParaRPr>
-          </a:p>
-          <a:p>
-            <a:endParaRPr lang="en-US" dirty="0">
-              <a:latin typeface="Palatino Linotype" panose="02040502050505030304" pitchFamily="18" charset="0"/>
-              <a:cs typeface="Segoe UI" panose="020B0502040204020203" pitchFamily="34" charset="0"/>
-            </a:endParaRPr>
-          </a:p>
-          <a:p>
-            <a:endParaRPr lang="en-US" dirty="0">
-              <a:latin typeface="Palatino Linotype" panose="02040502050505030304" pitchFamily="18" charset="0"/>
-              <a:cs typeface="Segoe UI" panose="020B0502040204020203" pitchFamily="34" charset="0"/>
-            </a:endParaRPr>
-          </a:p>
-        </p:txBody>
-      </p:sp>
-      <p:pic>
-        <p:nvPicPr>
-          <p:cNvPr id="4" name="Picture 3">
-            <a:extLst>
-              <a:ext uri="{FF2B5EF4-FFF2-40B4-BE49-F238E27FC236}">
-                <a16:creationId xmlns:a16="http://schemas.microsoft.com/office/drawing/2014/main" id="{BF227EC8-F25E-46CD-8CAE-24E18DBDE5CC}"/>
-              </a:ext>
-            </a:extLst>
-          </p:cNvPr>
-          <p:cNvPicPr>
-            <a:picLocks noChangeAspect="1"/>
-          </p:cNvPicPr>
-          <p:nvPr/>
-        </p:nvPicPr>
-        <p:blipFill>
-          <a:blip r:embed="rId3"/>
-          <a:stretch>
-            <a:fillRect/>
-          </a:stretch>
-        </p:blipFill>
-        <p:spPr>
-          <a:xfrm>
-            <a:off x="0" y="365760"/>
-            <a:ext cx="3233668" cy="805144"/>
-          </a:xfrm>
-          <a:prstGeom prst="rect">
-            <a:avLst/>
-          </a:prstGeom>
-        </p:spPr>
-      </p:pic>
-      <p:sp>
-        <p:nvSpPr>
-          <p:cNvPr id="5" name="TextBox 4">
-            <a:extLst>
-              <a:ext uri="{FF2B5EF4-FFF2-40B4-BE49-F238E27FC236}">
-                <a16:creationId xmlns:a16="http://schemas.microsoft.com/office/drawing/2014/main" id="{8760F1F0-4F7C-4834-B8EC-922F9AF83899}"/>
-              </a:ext>
-            </a:extLst>
-          </p:cNvPr>
-          <p:cNvSpPr txBox="1"/>
-          <p:nvPr/>
-        </p:nvSpPr>
-        <p:spPr>
-          <a:xfrm>
-            <a:off x="0" y="3291840"/>
-            <a:ext cx="12192000" cy="1200329"/>
-          </a:xfrm>
-          <a:prstGeom prst="rect">
-            <a:avLst/>
-          </a:prstGeom>
-          <a:noFill/>
-        </p:spPr>
-        <p:txBody>
-          <a:bodyPr wrap="square" rtlCol="0">
-            <a:spAutoFit/>
-          </a:bodyPr>
-          <a:lstStyle/>
-          <a:p>
-            <a:pPr algn="ctr"/>
-            <a:r>
-              <a:rPr lang="en-US" sz="3600" dirty="0">
-                <a:solidFill>
-                  <a:schemeClr val="tx1">
-                    <a:lumMod val="65000"/>
-                    <a:lumOff val="35000"/>
-                  </a:schemeClr>
-                </a:solidFill>
-                <a:latin typeface="Palatino Linotype" panose="02040502050505030304" pitchFamily="18" charset="0"/>
-              </a:rPr>
-              <a:t>A Cat &amp; Dog Classifier</a:t>
-            </a:r>
-          </a:p>
-          <a:p>
-            <a:pPr algn="ctr"/>
-            <a:r>
-              <a:rPr lang="en-US" sz="3600" dirty="0">
-                <a:solidFill>
-                  <a:schemeClr val="tx1">
-                    <a:lumMod val="65000"/>
-                    <a:lumOff val="35000"/>
-                  </a:schemeClr>
-                </a:solidFill>
-                <a:latin typeface="Palatino Linotype" panose="02040502050505030304" pitchFamily="18" charset="0"/>
-              </a:rPr>
-              <a:t>02.2_catdog.ipynb</a:t>
-            </a:r>
-            <a:endParaRPr lang="en-US" sz="3600" dirty="0"/>
-          </a:p>
-        </p:txBody>
-      </p:sp>
-    </p:spTree>
-    <p:extLst>
-      <p:ext uri="{BB962C8B-B14F-4D97-AF65-F5344CB8AC3E}">
-        <p14:creationId xmlns:p14="http://schemas.microsoft.com/office/powerpoint/2010/main" val="4096204018"/>
-      </p:ext>
-    </p:extLst>
-  </p:cSld>
-  <p:clrMapOvr>
-    <a:masterClrMapping/>
-  </p:clrMapOvr>
-  <mc:AlternateContent xmlns:mc="http://schemas.openxmlformats.org/markup-compatibility/2006" xmlns:p14="http://schemas.microsoft.com/office/powerpoint/2010/main">
-    <mc:Choice Requires="p14">
-      <p:transition spd="med" p14:dur="700">
-        <p:fade/>
-      </p:transition>
-    </mc:Choice>
-    <mc:Fallback xmlns="">
-      <p:transition spd="med">
         <p:fade/>
       </p:transition>
     </mc:Fallback>

</xml_diff>

<commit_message>
Updated session 3 notebooks.
</commit_message>
<xml_diff>
--- a/presentations/02_cnn_anatomy.pptx
+++ b/presentations/02_cnn_anatomy.pptx
@@ -236,7 +236,7 @@
           <a:p>
             <a:fld id="{FD93C9B2-20F6-4DB1-B471-224337D0AC79}" type="datetimeFigureOut">
               <a:rPr lang="en-US" smtClean="0"/>
-              <a:t>9/15/2022</a:t>
+              <a:t>9/16/2022</a:t>
             </a:fld>
             <a:endParaRPr lang="en-US"/>
           </a:p>
@@ -1100,7 +1100,7 @@
           <a:p>
             <a:r>
               <a:rPr lang="en-US" dirty="0"/>
-              <a:t>As we saw, during convolution we can imagine starting the filter in the upper-left pixel of the input image. The filter produces an output, then takes one step right, produces another output, moves another step right, and so on until it reaches the right edge of that row. Then it moves down one row and back to the left side, and the process repeats.  </a:t>
+              <a:t>With convolution,  we start the filter in the upper-left pixel of the input image. The filter produces an output, then takes one step right, produces another output, moves another step right, and so on until it reaches the right edge of that row. Then it moves down one row and back to the left side.  </a:t>
             </a:r>
           </a:p>
           <a:p>
@@ -1121,7 +1121,15 @@
           <a:p>
             <a:r>
               <a:rPr lang="en-US" dirty="0"/>
-              <a:t>But we don’t have to move in single steps. Suppose we move, or stride, more than one pixel to the right, or more than one pixel down, as we sweep our filter. Then our output will end up being smaller than the input. We usually use the word stride (and the related striding) only when we use steps greater than one in any dimension.  </a:t>
+              <a:t>But we don’t have to move in single steps.  We can move, or </a:t>
+            </a:r>
+            <a:r>
+              <a:rPr lang="en-US" b="1" dirty="0"/>
+              <a:t>stride</a:t>
+            </a:r>
+            <a:r>
+              <a:rPr lang="en-US" dirty="0"/>
+              <a:t>, more than one pixel to the right, or more than one pixel down, as we sweep our filter.  </a:t>
             </a:r>
           </a:p>
           <a:p>
@@ -1138,12 +1146,6 @@
           </a:p>
           <a:p>
             <a:endParaRPr lang="en-US" dirty="0"/>
-          </a:p>
-          <a:p>
-            <a:r>
-              <a:rPr lang="en-US" dirty="0"/>
-              <a:t>In both simulations, the filter moves starting from the upper left. As the filter moves left to right, it produces a sequence of outputs, and those get placed one after the other, also left to right, in the output. When the filter moves down, the new outputs go on a new line of cells in the output.</a:t>
-            </a:r>
           </a:p>
         </p:txBody>
       </p:sp>
@@ -1236,7 +1238,7 @@
                 <a:effectLst/>
                 <a:latin typeface="+mn-lt"/>
               </a:rPr>
-              <a:t>There’s a minor issue w/convolution operation.  When we convolve an image, the output tensor has smaller dimensions than the input.  </a:t>
+              <a:t>However, there’s a minor issue with convolution.  When we convolve an image, the output tensor has smaller dimensions than the input.  </a:t>
             </a:r>
           </a:p>
           <a:p>
@@ -1838,17 +1840,17 @@
                 <a:effectLst/>
                 <a:latin typeface="+mn-lt"/>
               </a:rPr>
-              <a:t>Pooling layers are used to reduce the dimensions of the feature maps of convolution layers. But why do we need to perform such down sampling</a:t>
-            </a:r>
-            <a:r>
-              <a:rPr lang="en-US" b="0" i="0">
+              <a:t>Pooling layers are used to reduce the dimensions of the feature maps of convolution layers. But why do we perform </a:t>
+            </a:r>
+            <a:r>
+              <a:rPr lang="en-US" b="1" i="0" dirty="0">
                 <a:solidFill>
                   <a:srgbClr val="6D737D"/>
                 </a:solidFill>
                 <a:effectLst/>
                 <a:latin typeface="+mn-lt"/>
               </a:rPr>
-              <a:t>?  One </a:t>
+              <a:t>down sampling</a:t>
             </a:r>
             <a:r>
               <a:rPr lang="en-US" b="0" i="0" dirty="0">
@@ -1858,7 +1860,7 @@
                 <a:effectLst/>
                 <a:latin typeface="+mn-lt"/>
               </a:rPr>
-              <a:t>of the main reasons is to reduce the number of calculations that are performed in the networks. Adding multiple layers of convolution with different filters can have a significant impact on the training time. Also, reducing the dimensions of feature maps can eliminate some of the noise in the feature map and help us focus only on the detected pattern. It is quite typical to add a pooling layer after each convolutional layer in order to reduce the size of the feature maps.</a:t>
+              <a:t>?   First, we do it to reduce the number of calculations a network must perform.  This speeds up the training process.  Second, down sampling eliminates some of the noise in the feature map.  It helps the model detect underlying patterns.</a:t>
             </a:r>
           </a:p>
           <a:p>
@@ -1881,27 +1883,7 @@
                 <a:effectLst/>
                 <a:latin typeface="+mn-lt"/>
               </a:rPr>
-              <a:t>A pooling operation acts like a filter, but rather than performing a convolution operation, it uses an aggregation function such as average or max (max is the most widely used function in the current CNN architecture). For instance, </a:t>
-            </a:r>
-            <a:r>
-              <a:rPr lang="en-US" b="1" i="0" dirty="0">
-                <a:solidFill>
-                  <a:srgbClr val="6D737D"/>
-                </a:solidFill>
-                <a:effectLst/>
-                <a:latin typeface="+mn-lt"/>
-              </a:rPr>
-              <a:t>max pooling</a:t>
-            </a:r>
-            <a:r>
-              <a:rPr lang="en-US" b="0" i="0" dirty="0">
-                <a:solidFill>
-                  <a:srgbClr val="6D737D"/>
-                </a:solidFill>
-                <a:effectLst/>
-                <a:latin typeface="+mn-lt"/>
-              </a:rPr>
-              <a:t> will look at a specific area of the feature map and find the maximum values of its pixels. Then, it performs a stride and finds the maximum value among the neighbor pixels. It repeats this process until it processes the entire image.  </a:t>
+              <a:t>A pooling operation acts like a filter.  But rather than performing a convolution operation, it uses an aggregation function such as average or max. </a:t>
             </a:r>
           </a:p>
           <a:p>
@@ -1949,7 +1931,7 @@
                 <a:effectLst/>
                 <a:latin typeface="+mn-lt"/>
               </a:rPr>
-              <a:t>The max filter is applied and the largest (max) number in the input image is added to the output tensor.  The colors help us see the connections between the input and the corresponding output.</a:t>
+              <a:t>The max filter is applied and the largest (max) number in the input image is added to the output tensor.  The result is 8 in the blue cell.</a:t>
             </a:r>
           </a:p>
           <a:p>
@@ -1964,20 +1946,8 @@
                 <a:effectLst/>
                 <a:latin typeface="+mn-lt"/>
               </a:rPr>
-              <a:t>In this example, our stride is two and the max pooling operation is once again applied, resulting in 7 as its output.</a:t>
-            </a:r>
-          </a:p>
-          <a:p>
-            <a:pPr marL="228600" indent="-228600" algn="l">
-              <a:buAutoNum type="arabicPeriod"/>
-            </a:pPr>
-            <a:endParaRPr lang="en-US" b="0" i="0" dirty="0">
-              <a:solidFill>
-                <a:srgbClr val="6D737D"/>
-              </a:solidFill>
-              <a:effectLst/>
-              <a:latin typeface="+mn-lt"/>
-            </a:endParaRPr>
+              <a:t>In this example, our stride is two and the max pooling operation is once again applied.  The result is 7 in the green cell.</a:t>
+            </a:r>
           </a:p>
           <a:p>
             <a:pPr algn="l"/>
@@ -3476,7 +3446,7 @@
                 <a:effectLst/>
                 <a:latin typeface="+mn-lt"/>
               </a:rPr>
-              <a:t>Variety of layers – just covering a couple now…</a:t>
+              <a:t>Many types and variations of layers – we just cover a few here.</a:t>
             </a:r>
           </a:p>
           <a:p>
@@ -3949,7 +3919,7 @@
             </a:pPr>
             <a:r>
               <a:rPr lang="en-US" dirty="0"/>
-              <a:t>Combine three values to represent ‘yellowness’ – output</a:t>
+              <a:t>We combine the three values to calculate the ‘yellowness’ of the pixel</a:t>
             </a:r>
           </a:p>
           <a:p>
@@ -4734,7 +4704,7 @@
           <a:p>
             <a:fld id="{C3F78080-8D0A-4BE8-A5B4-CB115102D524}" type="datetimeFigureOut">
               <a:rPr lang="en-US" smtClean="0"/>
-              <a:t>9/15/2022</a:t>
+              <a:t>9/16/2022</a:t>
             </a:fld>
             <a:endParaRPr lang="en-US"/>
           </a:p>
@@ -4932,7 +4902,7 @@
           <a:p>
             <a:fld id="{C3F78080-8D0A-4BE8-A5B4-CB115102D524}" type="datetimeFigureOut">
               <a:rPr lang="en-US" smtClean="0"/>
-              <a:t>9/15/2022</a:t>
+              <a:t>9/16/2022</a:t>
             </a:fld>
             <a:endParaRPr lang="en-US"/>
           </a:p>
@@ -5140,7 +5110,7 @@
           <a:p>
             <a:fld id="{C3F78080-8D0A-4BE8-A5B4-CB115102D524}" type="datetimeFigureOut">
               <a:rPr lang="en-US" smtClean="0"/>
-              <a:t>9/15/2022</a:t>
+              <a:t>9/16/2022</a:t>
             </a:fld>
             <a:endParaRPr lang="en-US"/>
           </a:p>
@@ -5338,7 +5308,7 @@
           <a:p>
             <a:fld id="{C3F78080-8D0A-4BE8-A5B4-CB115102D524}" type="datetimeFigureOut">
               <a:rPr lang="en-US" smtClean="0"/>
-              <a:t>9/15/2022</a:t>
+              <a:t>9/16/2022</a:t>
             </a:fld>
             <a:endParaRPr lang="en-US"/>
           </a:p>
@@ -5613,7 +5583,7 @@
           <a:p>
             <a:fld id="{C3F78080-8D0A-4BE8-A5B4-CB115102D524}" type="datetimeFigureOut">
               <a:rPr lang="en-US" smtClean="0"/>
-              <a:t>9/15/2022</a:t>
+              <a:t>9/16/2022</a:t>
             </a:fld>
             <a:endParaRPr lang="en-US"/>
           </a:p>
@@ -5878,7 +5848,7 @@
           <a:p>
             <a:fld id="{C3F78080-8D0A-4BE8-A5B4-CB115102D524}" type="datetimeFigureOut">
               <a:rPr lang="en-US" smtClean="0"/>
-              <a:t>9/15/2022</a:t>
+              <a:t>9/16/2022</a:t>
             </a:fld>
             <a:endParaRPr lang="en-US"/>
           </a:p>
@@ -6290,7 +6260,7 @@
           <a:p>
             <a:fld id="{C3F78080-8D0A-4BE8-A5B4-CB115102D524}" type="datetimeFigureOut">
               <a:rPr lang="en-US" smtClean="0"/>
-              <a:t>9/15/2022</a:t>
+              <a:t>9/16/2022</a:t>
             </a:fld>
             <a:endParaRPr lang="en-US"/>
           </a:p>
@@ -6431,7 +6401,7 @@
           <a:p>
             <a:fld id="{C3F78080-8D0A-4BE8-A5B4-CB115102D524}" type="datetimeFigureOut">
               <a:rPr lang="en-US" smtClean="0"/>
-              <a:t>9/15/2022</a:t>
+              <a:t>9/16/2022</a:t>
             </a:fld>
             <a:endParaRPr lang="en-US"/>
           </a:p>
@@ -6544,7 +6514,7 @@
           <a:p>
             <a:fld id="{C3F78080-8D0A-4BE8-A5B4-CB115102D524}" type="datetimeFigureOut">
               <a:rPr lang="en-US" smtClean="0"/>
-              <a:t>9/15/2022</a:t>
+              <a:t>9/16/2022</a:t>
             </a:fld>
             <a:endParaRPr lang="en-US"/>
           </a:p>
@@ -6855,7 +6825,7 @@
           <a:p>
             <a:fld id="{C3F78080-8D0A-4BE8-A5B4-CB115102D524}" type="datetimeFigureOut">
               <a:rPr lang="en-US" smtClean="0"/>
-              <a:t>9/15/2022</a:t>
+              <a:t>9/16/2022</a:t>
             </a:fld>
             <a:endParaRPr lang="en-US"/>
           </a:p>
@@ -7143,7 +7113,7 @@
           <a:p>
             <a:fld id="{C3F78080-8D0A-4BE8-A5B4-CB115102D524}" type="datetimeFigureOut">
               <a:rPr lang="en-US" smtClean="0"/>
-              <a:t>9/15/2022</a:t>
+              <a:t>9/16/2022</a:t>
             </a:fld>
             <a:endParaRPr lang="en-US"/>
           </a:p>
@@ -7384,7 +7354,7 @@
           <a:p>
             <a:fld id="{C3F78080-8D0A-4BE8-A5B4-CB115102D524}" type="datetimeFigureOut">
               <a:rPr lang="en-US" smtClean="0"/>
-              <a:t>9/15/2022</a:t>
+              <a:t>9/16/2022</a:t>
             </a:fld>
             <a:endParaRPr lang="en-US"/>
           </a:p>
@@ -13141,7 +13111,7 @@
                 </a:solidFill>
                 <a:latin typeface="Palatino Linotype" panose="02040502050505030304" pitchFamily="18" charset="0"/>
               </a:rPr>
-              <a:t>Images and Filters</a:t>
+              <a:t>Filters and Images</a:t>
             </a:r>
           </a:p>
         </p:txBody>

</xml_diff>